<commit_message>
Couple updates and added animations
</commit_message>
<xml_diff>
--- a/Images/Presentation/ImageReconstruction.pptx
+++ b/Images/Presentation/ImageReconstruction.pptx
@@ -163,7 +163,7 @@
       </p14:sectionLst>
     </p:ext>
     <p:ext uri="{EFAFB233-063F-42B5-8137-9DF3F51BA10A}">
-      <p15:sldGuideLst xmlns:p15="http://schemas.microsoft.com/office/powerpoint/2012/main" xmlns="">
+      <p15:sldGuideLst xmlns="" xmlns:p15="http://schemas.microsoft.com/office/powerpoint/2012/main">
         <p15:guide id="1" orient="horz" pos="2160" userDrawn="1">
           <p15:clr>
             <a:srgbClr val="A4A3A4"/>
@@ -16582,7 +16582,75 @@
   <p:timing>
     <p:tnLst>
       <p:par>
-        <p:cTn id="1" dur="indefinite" restart="never" nodeType="tmRoot"/>
+        <p:cTn id="1" dur="indefinite" restart="never" nodeType="tmRoot">
+          <p:childTnLst>
+            <p:seq concurrent="1" nextAc="seek">
+              <p:cTn id="2" dur="indefinite" nodeType="mainSeq">
+                <p:childTnLst>
+                  <p:par>
+                    <p:cTn id="3" fill="hold">
+                      <p:stCondLst>
+                        <p:cond delay="indefinite"/>
+                      </p:stCondLst>
+                      <p:childTnLst>
+                        <p:par>
+                          <p:cTn id="4" fill="hold">
+                            <p:stCondLst>
+                              <p:cond delay="0"/>
+                            </p:stCondLst>
+                            <p:childTnLst>
+                              <p:par>
+                                <p:cTn id="5" presetID="1" presetClass="entr" presetSubtype="0" fill="hold" nodeType="clickEffect">
+                                  <p:stCondLst>
+                                    <p:cond delay="0"/>
+                                  </p:stCondLst>
+                                  <p:childTnLst>
+                                    <p:set>
+                                      <p:cBhvr>
+                                        <p:cTn id="6" dur="1" fill="hold">
+                                          <p:stCondLst>
+                                            <p:cond delay="0"/>
+                                          </p:stCondLst>
+                                        </p:cTn>
+                                        <p:tgtEl>
+                                          <p:spTgt spid="7"/>
+                                        </p:tgtEl>
+                                        <p:attrNameLst>
+                                          <p:attrName>style.visibility</p:attrName>
+                                        </p:attrNameLst>
+                                      </p:cBhvr>
+                                      <p:to>
+                                        <p:strVal val="visible"/>
+                                      </p:to>
+                                    </p:set>
+                                  </p:childTnLst>
+                                </p:cTn>
+                              </p:par>
+                            </p:childTnLst>
+                          </p:cTn>
+                        </p:par>
+                      </p:childTnLst>
+                    </p:cTn>
+                  </p:par>
+                </p:childTnLst>
+              </p:cTn>
+              <p:prevCondLst>
+                <p:cond evt="onPrev" delay="0">
+                  <p:tgtEl>
+                    <p:sldTgt/>
+                  </p:tgtEl>
+                </p:cond>
+              </p:prevCondLst>
+              <p:nextCondLst>
+                <p:cond evt="onNext" delay="0">
+                  <p:tgtEl>
+                    <p:sldTgt/>
+                  </p:tgtEl>
+                </p:cond>
+              </p:nextCondLst>
+            </p:seq>
+          </p:childTnLst>
+        </p:cTn>
       </p:par>
     </p:tnLst>
   </p:timing>
@@ -17075,9 +17143,161 @@
   <p:timing>
     <p:tnLst>
       <p:par>
-        <p:cTn id="1" dur="indefinite" restart="never" nodeType="tmRoot"/>
+        <p:cTn id="1" dur="indefinite" restart="never" nodeType="tmRoot">
+          <p:childTnLst>
+            <p:seq concurrent="1" nextAc="seek">
+              <p:cTn id="2" dur="indefinite" nodeType="mainSeq">
+                <p:childTnLst>
+                  <p:par>
+                    <p:cTn id="3" fill="hold">
+                      <p:stCondLst>
+                        <p:cond delay="indefinite"/>
+                      </p:stCondLst>
+                      <p:childTnLst>
+                        <p:par>
+                          <p:cTn id="4" fill="hold">
+                            <p:stCondLst>
+                              <p:cond delay="0"/>
+                            </p:stCondLst>
+                            <p:childTnLst>
+                              <p:par>
+                                <p:cTn id="5" presetID="1" presetClass="entr" presetSubtype="0" fill="hold" nodeType="clickEffect">
+                                  <p:stCondLst>
+                                    <p:cond delay="0"/>
+                                  </p:stCondLst>
+                                  <p:childTnLst>
+                                    <p:set>
+                                      <p:cBhvr>
+                                        <p:cTn id="6" dur="1" fill="hold">
+                                          <p:stCondLst>
+                                            <p:cond delay="0"/>
+                                          </p:stCondLst>
+                                        </p:cTn>
+                                        <p:tgtEl>
+                                          <p:spTgt spid="5"/>
+                                        </p:tgtEl>
+                                        <p:attrNameLst>
+                                          <p:attrName>style.visibility</p:attrName>
+                                        </p:attrNameLst>
+                                      </p:cBhvr>
+                                      <p:to>
+                                        <p:strVal val="visible"/>
+                                      </p:to>
+                                    </p:set>
+                                  </p:childTnLst>
+                                </p:cTn>
+                              </p:par>
+                              <p:par>
+                                <p:cTn id="7" presetID="1" presetClass="entr" presetSubtype="0" fill="hold" nodeType="withEffect">
+                                  <p:stCondLst>
+                                    <p:cond delay="0"/>
+                                  </p:stCondLst>
+                                  <p:childTnLst>
+                                    <p:set>
+                                      <p:cBhvr>
+                                        <p:cTn id="8" dur="1" fill="hold">
+                                          <p:stCondLst>
+                                            <p:cond delay="0"/>
+                                          </p:stCondLst>
+                                        </p:cTn>
+                                        <p:tgtEl>
+                                          <p:spTgt spid="8"/>
+                                        </p:tgtEl>
+                                        <p:attrNameLst>
+                                          <p:attrName>style.visibility</p:attrName>
+                                        </p:attrNameLst>
+                                      </p:cBhvr>
+                                      <p:to>
+                                        <p:strVal val="visible"/>
+                                      </p:to>
+                                    </p:set>
+                                  </p:childTnLst>
+                                </p:cTn>
+                              </p:par>
+                              <p:par>
+                                <p:cTn id="9" presetID="1" presetClass="entr" presetSubtype="0" fill="hold" grpId="0" nodeType="withEffect">
+                                  <p:stCondLst>
+                                    <p:cond delay="0"/>
+                                  </p:stCondLst>
+                                  <p:childTnLst>
+                                    <p:set>
+                                      <p:cBhvr>
+                                        <p:cTn id="10" dur="1" fill="hold">
+                                          <p:stCondLst>
+                                            <p:cond delay="0"/>
+                                          </p:stCondLst>
+                                        </p:cTn>
+                                        <p:tgtEl>
+                                          <p:spTgt spid="9"/>
+                                        </p:tgtEl>
+                                        <p:attrNameLst>
+                                          <p:attrName>style.visibility</p:attrName>
+                                        </p:attrNameLst>
+                                      </p:cBhvr>
+                                      <p:to>
+                                        <p:strVal val="visible"/>
+                                      </p:to>
+                                    </p:set>
+                                  </p:childTnLst>
+                                </p:cTn>
+                              </p:par>
+                              <p:par>
+                                <p:cTn id="11" presetID="1" presetClass="entr" presetSubtype="0" fill="hold" nodeType="withEffect">
+                                  <p:stCondLst>
+                                    <p:cond delay="0"/>
+                                  </p:stCondLst>
+                                  <p:childTnLst>
+                                    <p:set>
+                                      <p:cBhvr>
+                                        <p:cTn id="12" dur="1" fill="hold">
+                                          <p:stCondLst>
+                                            <p:cond delay="0"/>
+                                          </p:stCondLst>
+                                        </p:cTn>
+                                        <p:tgtEl>
+                                          <p:spTgt spid="4"/>
+                                        </p:tgtEl>
+                                        <p:attrNameLst>
+                                          <p:attrName>style.visibility</p:attrName>
+                                        </p:attrNameLst>
+                                      </p:cBhvr>
+                                      <p:to>
+                                        <p:strVal val="visible"/>
+                                      </p:to>
+                                    </p:set>
+                                  </p:childTnLst>
+                                </p:cTn>
+                              </p:par>
+                            </p:childTnLst>
+                          </p:cTn>
+                        </p:par>
+                      </p:childTnLst>
+                    </p:cTn>
+                  </p:par>
+                </p:childTnLst>
+              </p:cTn>
+              <p:prevCondLst>
+                <p:cond evt="onPrev" delay="0">
+                  <p:tgtEl>
+                    <p:sldTgt/>
+                  </p:tgtEl>
+                </p:cond>
+              </p:prevCondLst>
+              <p:nextCondLst>
+                <p:cond evt="onNext" delay="0">
+                  <p:tgtEl>
+                    <p:sldTgt/>
+                  </p:tgtEl>
+                </p:cond>
+              </p:nextCondLst>
+            </p:seq>
+          </p:childTnLst>
+        </p:cTn>
       </p:par>
     </p:tnLst>
+    <p:bldLst>
+      <p:bldP spid="9" grpId="0"/>
+    </p:bldLst>
   </p:timing>
 </p:sld>
 </file>
@@ -17362,50 +17582,14 @@
         </p:blipFill>
         <p:spPr>
           <a:xfrm>
-            <a:off x="685800" y="2819400"/>
-            <a:ext cx="2418019" cy="2418019"/>
+            <a:off x="839532" y="2057400"/>
+            <a:ext cx="1979868" cy="1979868"/>
           </a:xfrm>
           <a:prstGeom prst="rect">
             <a:avLst/>
           </a:prstGeom>
         </p:spPr>
       </p:pic>
-      <p:cxnSp>
-        <p:nvCxnSpPr>
-          <p:cNvPr id="11" name="Straight Arrow Connector 10"/>
-          <p:cNvCxnSpPr>
-            <a:stCxn id="9" idx="3"/>
-            <a:endCxn id="5" idx="1"/>
-          </p:cNvCxnSpPr>
-          <p:nvPr/>
-        </p:nvCxnSpPr>
-        <p:spPr>
-          <a:xfrm>
-            <a:off x="3103819" y="4028410"/>
-            <a:ext cx="1783172" cy="0"/>
-          </a:xfrm>
-          <a:prstGeom prst="straightConnector1">
-            <a:avLst/>
-          </a:prstGeom>
-          <a:ln w="19050">
-            <a:tailEnd type="triangle"/>
-          </a:ln>
-        </p:spPr>
-        <p:style>
-          <a:lnRef idx="1">
-            <a:schemeClr val="dk1"/>
-          </a:lnRef>
-          <a:fillRef idx="0">
-            <a:schemeClr val="dk1"/>
-          </a:fillRef>
-          <a:effectRef idx="0">
-            <a:schemeClr val="dk1"/>
-          </a:effectRef>
-          <a:fontRef idx="minor">
-            <a:schemeClr val="tx1"/>
-          </a:fontRef>
-        </p:style>
-      </p:cxnSp>
       <p:cxnSp>
         <p:nvCxnSpPr>
           <p:cNvPr id="13" name="Straight Arrow Connector 12"/>
@@ -17442,8 +17626,8 @@
           </a:fontRef>
         </p:style>
       </p:cxnSp>
-      <mc:AlternateContent xmlns:mc="http://schemas.openxmlformats.org/markup-compatibility/2006" xmlns:a14="http://schemas.microsoft.com/office/drawing/2010/main">
-        <mc:Choice Requires="a14">
+      <mc:AlternateContent xmlns:mc="http://schemas.openxmlformats.org/markup-compatibility/2006">
+        <mc:Choice xmlns:a14="http://schemas.microsoft.com/office/drawing/2010/main" Requires="a14">
           <p:sp>
             <p:nvSpPr>
               <p:cNvPr id="16" name="TextBox 15"/>
@@ -17452,7 +17636,7 @@
             </p:nvSpPr>
             <p:spPr>
               <a:xfrm>
-                <a:off x="3263884" y="4191000"/>
+                <a:off x="7452358" y="4191000"/>
                 <a:ext cx="1463042" cy="369332"/>
               </a:xfrm>
               <a:prstGeom prst="rect">
@@ -17501,7 +17685,7 @@
             </p:txBody>
           </p:sp>
         </mc:Choice>
-        <mc:Fallback xmlns="">
+        <mc:Fallback>
           <p:sp>
             <p:nvSpPr>
               <p:cNvPr id="16" name="TextBox 15"/>
@@ -17512,7 +17696,7 @@
             </p:nvSpPr>
             <p:spPr>
               <a:xfrm>
-                <a:off x="3263884" y="4191000"/>
+                <a:off x="7452358" y="4191000"/>
                 <a:ext cx="1463042" cy="369332"/>
               </a:xfrm>
               <a:prstGeom prst="rect">
@@ -17540,6 +17724,109 @@
           </p:sp>
         </mc:Fallback>
       </mc:AlternateContent>
+      <p:cxnSp>
+        <p:nvCxnSpPr>
+          <p:cNvPr id="12" name="Elbow Connector 11"/>
+          <p:cNvCxnSpPr>
+            <a:stCxn id="9" idx="3"/>
+            <a:endCxn id="5" idx="1"/>
+          </p:cNvCxnSpPr>
+          <p:nvPr/>
+        </p:nvCxnSpPr>
+        <p:spPr>
+          <a:xfrm>
+            <a:off x="2819400" y="3047334"/>
+            <a:ext cx="2067591" cy="981076"/>
+          </a:xfrm>
+          <a:prstGeom prst="bentConnector3">
+            <a:avLst/>
+          </a:prstGeom>
+          <a:ln w="19050">
+            <a:tailEnd type="triangle"/>
+          </a:ln>
+        </p:spPr>
+        <p:style>
+          <a:lnRef idx="1">
+            <a:schemeClr val="dk1"/>
+          </a:lnRef>
+          <a:fillRef idx="0">
+            <a:schemeClr val="dk1"/>
+          </a:fillRef>
+          <a:effectRef idx="0">
+            <a:schemeClr val="dk1"/>
+          </a:effectRef>
+          <a:fontRef idx="minor">
+            <a:schemeClr val="tx1"/>
+          </a:fontRef>
+        </p:style>
+      </p:cxnSp>
+      <p:pic>
+        <p:nvPicPr>
+          <p:cNvPr id="14" name="Picture 13"/>
+          <p:cNvPicPr>
+            <a:picLocks noChangeAspect="1"/>
+          </p:cNvPicPr>
+          <p:nvPr/>
+        </p:nvPicPr>
+        <p:blipFill rotWithShape="1">
+          <a:blip r:embed="rId7">
+            <a:extLst>
+              <a:ext uri="{28A0092B-C50C-407E-A947-70E740481C1C}">
+                <a14:useLocalDpi xmlns:a14="http://schemas.microsoft.com/office/drawing/2010/main" val="0"/>
+              </a:ext>
+            </a:extLst>
+          </a:blip>
+          <a:srcRect b="14325"/>
+          <a:stretch/>
+        </p:blipFill>
+        <p:spPr>
+          <a:xfrm>
+            <a:off x="839532" y="4476750"/>
+            <a:ext cx="1964162" cy="1974850"/>
+          </a:xfrm>
+          <a:prstGeom prst="rect">
+            <a:avLst/>
+          </a:prstGeom>
+        </p:spPr>
+      </p:pic>
+      <p:cxnSp>
+        <p:nvCxnSpPr>
+          <p:cNvPr id="17" name="Elbow Connector 16"/>
+          <p:cNvCxnSpPr>
+            <a:stCxn id="14" idx="3"/>
+            <a:endCxn id="5" idx="1"/>
+          </p:cNvCxnSpPr>
+          <p:nvPr/>
+        </p:nvCxnSpPr>
+        <p:spPr>
+          <a:xfrm flipV="1">
+            <a:off x="2803694" y="4028410"/>
+            <a:ext cx="2083297" cy="1435765"/>
+          </a:xfrm>
+          <a:prstGeom prst="bentConnector3">
+            <a:avLst>
+              <a:gd name="adj1" fmla="val 50000"/>
+            </a:avLst>
+          </a:prstGeom>
+          <a:ln w="19050">
+            <a:tailEnd type="triangle"/>
+          </a:ln>
+        </p:spPr>
+        <p:style>
+          <a:lnRef idx="1">
+            <a:schemeClr val="dk1"/>
+          </a:lnRef>
+          <a:fillRef idx="0">
+            <a:schemeClr val="dk1"/>
+          </a:fillRef>
+          <a:effectRef idx="0">
+            <a:schemeClr val="dk1"/>
+          </a:effectRef>
+          <a:fontRef idx="minor">
+            <a:schemeClr val="tx1"/>
+          </a:fontRef>
+        </p:style>
+      </p:cxnSp>
     </p:spTree>
     <p:extLst>
       <p:ext uri="{BB962C8B-B14F-4D97-AF65-F5344CB8AC3E}">
@@ -17553,9 +17840,323 @@
   <p:timing>
     <p:tnLst>
       <p:par>
-        <p:cTn id="1" dur="indefinite" restart="never" nodeType="tmRoot"/>
+        <p:cTn id="1" dur="indefinite" restart="never" nodeType="tmRoot">
+          <p:childTnLst>
+            <p:seq concurrent="1" nextAc="seek">
+              <p:cTn id="2" dur="indefinite" nodeType="mainSeq">
+                <p:childTnLst>
+                  <p:par>
+                    <p:cTn id="3" fill="hold">
+                      <p:stCondLst>
+                        <p:cond delay="indefinite"/>
+                      </p:stCondLst>
+                      <p:childTnLst>
+                        <p:par>
+                          <p:cTn id="4" fill="hold">
+                            <p:stCondLst>
+                              <p:cond delay="0"/>
+                            </p:stCondLst>
+                            <p:childTnLst>
+                              <p:par>
+                                <p:cTn id="5" presetID="1" presetClass="entr" presetSubtype="0" fill="hold" nodeType="clickEffect">
+                                  <p:stCondLst>
+                                    <p:cond delay="0"/>
+                                  </p:stCondLst>
+                                  <p:childTnLst>
+                                    <p:set>
+                                      <p:cBhvr>
+                                        <p:cTn id="6" dur="1" fill="hold">
+                                          <p:stCondLst>
+                                            <p:cond delay="0"/>
+                                          </p:stCondLst>
+                                        </p:cTn>
+                                        <p:tgtEl>
+                                          <p:spTgt spid="9"/>
+                                        </p:tgtEl>
+                                        <p:attrNameLst>
+                                          <p:attrName>style.visibility</p:attrName>
+                                        </p:attrNameLst>
+                                      </p:cBhvr>
+                                      <p:to>
+                                        <p:strVal val="visible"/>
+                                      </p:to>
+                                    </p:set>
+                                  </p:childTnLst>
+                                </p:cTn>
+                              </p:par>
+                            </p:childTnLst>
+                          </p:cTn>
+                        </p:par>
+                      </p:childTnLst>
+                    </p:cTn>
+                  </p:par>
+                  <p:par>
+                    <p:cTn id="7" fill="hold">
+                      <p:stCondLst>
+                        <p:cond delay="indefinite"/>
+                      </p:stCondLst>
+                      <p:childTnLst>
+                        <p:par>
+                          <p:cTn id="8" fill="hold">
+                            <p:stCondLst>
+                              <p:cond delay="0"/>
+                            </p:stCondLst>
+                            <p:childTnLst>
+                              <p:par>
+                                <p:cTn id="9" presetID="1" presetClass="entr" presetSubtype="0" fill="hold" nodeType="clickEffect">
+                                  <p:stCondLst>
+                                    <p:cond delay="0"/>
+                                  </p:stCondLst>
+                                  <p:childTnLst>
+                                    <p:set>
+                                      <p:cBhvr>
+                                        <p:cTn id="10" dur="1" fill="hold">
+                                          <p:stCondLst>
+                                            <p:cond delay="0"/>
+                                          </p:stCondLst>
+                                        </p:cTn>
+                                        <p:tgtEl>
+                                          <p:spTgt spid="14"/>
+                                        </p:tgtEl>
+                                        <p:attrNameLst>
+                                          <p:attrName>style.visibility</p:attrName>
+                                        </p:attrNameLst>
+                                      </p:cBhvr>
+                                      <p:to>
+                                        <p:strVal val="visible"/>
+                                      </p:to>
+                                    </p:set>
+                                  </p:childTnLst>
+                                </p:cTn>
+                              </p:par>
+                            </p:childTnLst>
+                          </p:cTn>
+                        </p:par>
+                      </p:childTnLst>
+                    </p:cTn>
+                  </p:par>
+                  <p:par>
+                    <p:cTn id="11" fill="hold">
+                      <p:stCondLst>
+                        <p:cond delay="indefinite"/>
+                      </p:stCondLst>
+                      <p:childTnLst>
+                        <p:par>
+                          <p:cTn id="12" fill="hold">
+                            <p:stCondLst>
+                              <p:cond delay="0"/>
+                            </p:stCondLst>
+                            <p:childTnLst>
+                              <p:par>
+                                <p:cTn id="13" presetID="1" presetClass="entr" presetSubtype="0" fill="hold" nodeType="clickEffect">
+                                  <p:stCondLst>
+                                    <p:cond delay="0"/>
+                                  </p:stCondLst>
+                                  <p:childTnLst>
+                                    <p:set>
+                                      <p:cBhvr>
+                                        <p:cTn id="14" dur="1" fill="hold">
+                                          <p:stCondLst>
+                                            <p:cond delay="0"/>
+                                          </p:stCondLst>
+                                        </p:cTn>
+                                        <p:tgtEl>
+                                          <p:spTgt spid="12"/>
+                                        </p:tgtEl>
+                                        <p:attrNameLst>
+                                          <p:attrName>style.visibility</p:attrName>
+                                        </p:attrNameLst>
+                                      </p:cBhvr>
+                                      <p:to>
+                                        <p:strVal val="visible"/>
+                                      </p:to>
+                                    </p:set>
+                                  </p:childTnLst>
+                                </p:cTn>
+                              </p:par>
+                              <p:par>
+                                <p:cTn id="15" presetID="1" presetClass="entr" presetSubtype="0" fill="hold" nodeType="withEffect">
+                                  <p:stCondLst>
+                                    <p:cond delay="0"/>
+                                  </p:stCondLst>
+                                  <p:childTnLst>
+                                    <p:set>
+                                      <p:cBhvr>
+                                        <p:cTn id="16" dur="1" fill="hold">
+                                          <p:stCondLst>
+                                            <p:cond delay="0"/>
+                                          </p:stCondLst>
+                                        </p:cTn>
+                                        <p:tgtEl>
+                                          <p:spTgt spid="17"/>
+                                        </p:tgtEl>
+                                        <p:attrNameLst>
+                                          <p:attrName>style.visibility</p:attrName>
+                                        </p:attrNameLst>
+                                      </p:cBhvr>
+                                      <p:to>
+                                        <p:strVal val="visible"/>
+                                      </p:to>
+                                    </p:set>
+                                  </p:childTnLst>
+                                </p:cTn>
+                              </p:par>
+                              <p:par>
+                                <p:cTn id="17" presetID="1" presetClass="entr" presetSubtype="0" fill="hold" nodeType="withEffect">
+                                  <p:stCondLst>
+                                    <p:cond delay="0"/>
+                                  </p:stCondLst>
+                                  <p:childTnLst>
+                                    <p:set>
+                                      <p:cBhvr>
+                                        <p:cTn id="18" dur="1" fill="hold">
+                                          <p:stCondLst>
+                                            <p:cond delay="0"/>
+                                          </p:stCondLst>
+                                        </p:cTn>
+                                        <p:tgtEl>
+                                          <p:spTgt spid="5"/>
+                                        </p:tgtEl>
+                                        <p:attrNameLst>
+                                          <p:attrName>style.visibility</p:attrName>
+                                        </p:attrNameLst>
+                                      </p:cBhvr>
+                                      <p:to>
+                                        <p:strVal val="visible"/>
+                                      </p:to>
+                                    </p:set>
+                                  </p:childTnLst>
+                                </p:cTn>
+                              </p:par>
+                            </p:childTnLst>
+                          </p:cTn>
+                        </p:par>
+                      </p:childTnLst>
+                    </p:cTn>
+                  </p:par>
+                  <p:par>
+                    <p:cTn id="19" fill="hold">
+                      <p:stCondLst>
+                        <p:cond delay="indefinite"/>
+                      </p:stCondLst>
+                      <p:childTnLst>
+                        <p:par>
+                          <p:cTn id="20" fill="hold">
+                            <p:stCondLst>
+                              <p:cond delay="0"/>
+                            </p:stCondLst>
+                            <p:childTnLst>
+                              <p:par>
+                                <p:cTn id="21" presetID="1" presetClass="entr" presetSubtype="0" fill="hold" nodeType="clickEffect">
+                                  <p:stCondLst>
+                                    <p:cond delay="0"/>
+                                  </p:stCondLst>
+                                  <p:childTnLst>
+                                    <p:set>
+                                      <p:cBhvr>
+                                        <p:cTn id="22" dur="1" fill="hold">
+                                          <p:stCondLst>
+                                            <p:cond delay="0"/>
+                                          </p:stCondLst>
+                                        </p:cTn>
+                                        <p:tgtEl>
+                                          <p:spTgt spid="13"/>
+                                        </p:tgtEl>
+                                        <p:attrNameLst>
+                                          <p:attrName>style.visibility</p:attrName>
+                                        </p:attrNameLst>
+                                      </p:cBhvr>
+                                      <p:to>
+                                        <p:strVal val="visible"/>
+                                      </p:to>
+                                    </p:set>
+                                  </p:childTnLst>
+                                </p:cTn>
+                              </p:par>
+                              <p:par>
+                                <p:cTn id="23" presetID="1" presetClass="entr" presetSubtype="0" fill="hold" grpId="0" nodeType="withEffect">
+                                  <p:stCondLst>
+                                    <p:cond delay="0"/>
+                                  </p:stCondLst>
+                                  <p:childTnLst>
+                                    <p:set>
+                                      <p:cBhvr>
+                                        <p:cTn id="24" dur="1" fill="hold">
+                                          <p:stCondLst>
+                                            <p:cond delay="0"/>
+                                          </p:stCondLst>
+                                        </p:cTn>
+                                        <p:tgtEl>
+                                          <p:spTgt spid="16"/>
+                                        </p:tgtEl>
+                                        <p:attrNameLst>
+                                          <p:attrName>style.visibility</p:attrName>
+                                        </p:attrNameLst>
+                                      </p:cBhvr>
+                                      <p:to>
+                                        <p:strVal val="visible"/>
+                                      </p:to>
+                                    </p:set>
+                                  </p:childTnLst>
+                                </p:cTn>
+                              </p:par>
+                              <p:par>
+                                <p:cTn id="25" presetID="1" presetClass="entr" presetSubtype="0" fill="hold" nodeType="withEffect">
+                                  <p:stCondLst>
+                                    <p:cond delay="0"/>
+                                  </p:stCondLst>
+                                  <p:childTnLst>
+                                    <p:set>
+                                      <p:cBhvr>
+                                        <p:cTn id="26" dur="1" fill="hold">
+                                          <p:stCondLst>
+                                            <p:cond delay="0"/>
+                                          </p:stCondLst>
+                                        </p:cTn>
+                                        <p:tgtEl>
+                                          <p:spTgt spid="7"/>
+                                        </p:tgtEl>
+                                        <p:attrNameLst>
+                                          <p:attrName>style.visibility</p:attrName>
+                                        </p:attrNameLst>
+                                      </p:cBhvr>
+                                      <p:to>
+                                        <p:strVal val="visible"/>
+                                      </p:to>
+                                    </p:set>
+                                  </p:childTnLst>
+                                </p:cTn>
+                              </p:par>
+                            </p:childTnLst>
+                          </p:cTn>
+                        </p:par>
+                      </p:childTnLst>
+                    </p:cTn>
+                  </p:par>
+                </p:childTnLst>
+              </p:cTn>
+              <p:prevCondLst>
+                <p:cond evt="onPrev" delay="0">
+                  <p:tgtEl>
+                    <p:sldTgt/>
+                  </p:tgtEl>
+                </p:cond>
+              </p:prevCondLst>
+              <p:nextCondLst>
+                <p:cond evt="onNext" delay="0">
+                  <p:tgtEl>
+                    <p:sldTgt/>
+                  </p:tgtEl>
+                </p:cond>
+              </p:nextCondLst>
+            </p:seq>
+          </p:childTnLst>
+        </p:cTn>
       </p:par>
     </p:tnLst>
+    <p:bldLst>
+      <p:bldP spid="16" grpId="0"/>
+    </p:bldLst>
   </p:timing>
 </p:sld>
 </file>
@@ -18631,9 +19232,406 @@
   <p:timing>
     <p:tnLst>
       <p:par>
-        <p:cTn id="1" dur="indefinite" restart="never" nodeType="tmRoot"/>
+        <p:cTn id="1" dur="indefinite" restart="never" nodeType="tmRoot">
+          <p:childTnLst>
+            <p:seq concurrent="1" nextAc="seek">
+              <p:cTn id="2" dur="indefinite" nodeType="mainSeq">
+                <p:childTnLst>
+                  <p:par>
+                    <p:cTn id="3" fill="hold">
+                      <p:stCondLst>
+                        <p:cond delay="indefinite"/>
+                      </p:stCondLst>
+                      <p:childTnLst>
+                        <p:par>
+                          <p:cTn id="4" fill="hold">
+                            <p:stCondLst>
+                              <p:cond delay="0"/>
+                            </p:stCondLst>
+                            <p:childTnLst>
+                              <p:par>
+                                <p:cTn id="5" presetID="1" presetClass="entr" presetSubtype="0" fill="hold" nodeType="clickEffect">
+                                  <p:stCondLst>
+                                    <p:cond delay="0"/>
+                                  </p:stCondLst>
+                                  <p:childTnLst>
+                                    <p:set>
+                                      <p:cBhvr>
+                                        <p:cTn id="6" dur="1" fill="hold">
+                                          <p:stCondLst>
+                                            <p:cond delay="0"/>
+                                          </p:stCondLst>
+                                        </p:cTn>
+                                        <p:tgtEl>
+                                          <p:spTgt spid="15"/>
+                                        </p:tgtEl>
+                                        <p:attrNameLst>
+                                          <p:attrName>style.visibility</p:attrName>
+                                        </p:attrNameLst>
+                                      </p:cBhvr>
+                                      <p:to>
+                                        <p:strVal val="visible"/>
+                                      </p:to>
+                                    </p:set>
+                                  </p:childTnLst>
+                                </p:cTn>
+                              </p:par>
+                            </p:childTnLst>
+                          </p:cTn>
+                        </p:par>
+                      </p:childTnLst>
+                    </p:cTn>
+                  </p:par>
+                  <p:par>
+                    <p:cTn id="7" fill="hold">
+                      <p:stCondLst>
+                        <p:cond delay="indefinite"/>
+                      </p:stCondLst>
+                      <p:childTnLst>
+                        <p:par>
+                          <p:cTn id="8" fill="hold">
+                            <p:stCondLst>
+                              <p:cond delay="0"/>
+                            </p:stCondLst>
+                            <p:childTnLst>
+                              <p:par>
+                                <p:cTn id="9" presetID="1" presetClass="entr" presetSubtype="0" fill="hold" nodeType="clickEffect">
+                                  <p:stCondLst>
+                                    <p:cond delay="0"/>
+                                  </p:stCondLst>
+                                  <p:childTnLst>
+                                    <p:set>
+                                      <p:cBhvr>
+                                        <p:cTn id="10" dur="1" fill="hold">
+                                          <p:stCondLst>
+                                            <p:cond delay="0"/>
+                                          </p:stCondLst>
+                                        </p:cTn>
+                                        <p:tgtEl>
+                                          <p:spTgt spid="8"/>
+                                        </p:tgtEl>
+                                        <p:attrNameLst>
+                                          <p:attrName>style.visibility</p:attrName>
+                                        </p:attrNameLst>
+                                      </p:cBhvr>
+                                      <p:to>
+                                        <p:strVal val="visible"/>
+                                      </p:to>
+                                    </p:set>
+                                  </p:childTnLst>
+                                </p:cTn>
+                              </p:par>
+                              <p:par>
+                                <p:cTn id="11" presetID="1" presetClass="entr" presetSubtype="0" fill="hold" nodeType="withEffect">
+                                  <p:stCondLst>
+                                    <p:cond delay="0"/>
+                                  </p:stCondLst>
+                                  <p:childTnLst>
+                                    <p:set>
+                                      <p:cBhvr>
+                                        <p:cTn id="12" dur="1" fill="hold">
+                                          <p:stCondLst>
+                                            <p:cond delay="0"/>
+                                          </p:stCondLst>
+                                        </p:cTn>
+                                        <p:tgtEl>
+                                          <p:spTgt spid="9"/>
+                                        </p:tgtEl>
+                                        <p:attrNameLst>
+                                          <p:attrName>style.visibility</p:attrName>
+                                        </p:attrNameLst>
+                                      </p:cBhvr>
+                                      <p:to>
+                                        <p:strVal val="visible"/>
+                                      </p:to>
+                                    </p:set>
+                                  </p:childTnLst>
+                                </p:cTn>
+                              </p:par>
+                              <p:par>
+                                <p:cTn id="13" presetID="1" presetClass="entr" presetSubtype="0" fill="hold" grpId="0" nodeType="withEffect">
+                                  <p:stCondLst>
+                                    <p:cond delay="0"/>
+                                  </p:stCondLst>
+                                  <p:childTnLst>
+                                    <p:set>
+                                      <p:cBhvr>
+                                        <p:cTn id="14" dur="1" fill="hold">
+                                          <p:stCondLst>
+                                            <p:cond delay="0"/>
+                                          </p:stCondLst>
+                                        </p:cTn>
+                                        <p:tgtEl>
+                                          <p:spTgt spid="12"/>
+                                        </p:tgtEl>
+                                        <p:attrNameLst>
+                                          <p:attrName>style.visibility</p:attrName>
+                                        </p:attrNameLst>
+                                      </p:cBhvr>
+                                      <p:to>
+                                        <p:strVal val="visible"/>
+                                      </p:to>
+                                    </p:set>
+                                  </p:childTnLst>
+                                </p:cTn>
+                              </p:par>
+                              <p:par>
+                                <p:cTn id="15" presetID="1" presetClass="entr" presetSubtype="0" fill="hold" nodeType="withEffect">
+                                  <p:stCondLst>
+                                    <p:cond delay="0"/>
+                                  </p:stCondLst>
+                                  <p:childTnLst>
+                                    <p:set>
+                                      <p:cBhvr>
+                                        <p:cTn id="16" dur="1" fill="hold">
+                                          <p:stCondLst>
+                                            <p:cond delay="0"/>
+                                          </p:stCondLst>
+                                        </p:cTn>
+                                        <p:tgtEl>
+                                          <p:spTgt spid="5"/>
+                                        </p:tgtEl>
+                                        <p:attrNameLst>
+                                          <p:attrName>style.visibility</p:attrName>
+                                        </p:attrNameLst>
+                                      </p:cBhvr>
+                                      <p:to>
+                                        <p:strVal val="visible"/>
+                                      </p:to>
+                                    </p:set>
+                                  </p:childTnLst>
+                                </p:cTn>
+                              </p:par>
+                            </p:childTnLst>
+                          </p:cTn>
+                        </p:par>
+                      </p:childTnLst>
+                    </p:cTn>
+                  </p:par>
+                  <p:par>
+                    <p:cTn id="17" fill="hold">
+                      <p:stCondLst>
+                        <p:cond delay="indefinite"/>
+                      </p:stCondLst>
+                      <p:childTnLst>
+                        <p:par>
+                          <p:cTn id="18" fill="hold">
+                            <p:stCondLst>
+                              <p:cond delay="0"/>
+                            </p:stCondLst>
+                            <p:childTnLst>
+                              <p:par>
+                                <p:cTn id="19" presetID="1" presetClass="entr" presetSubtype="0" fill="hold" nodeType="clickEffect">
+                                  <p:stCondLst>
+                                    <p:cond delay="0"/>
+                                  </p:stCondLst>
+                                  <p:childTnLst>
+                                    <p:set>
+                                      <p:cBhvr>
+                                        <p:cTn id="20" dur="1" fill="hold">
+                                          <p:stCondLst>
+                                            <p:cond delay="0"/>
+                                          </p:stCondLst>
+                                        </p:cTn>
+                                        <p:tgtEl>
+                                          <p:spTgt spid="10"/>
+                                        </p:tgtEl>
+                                        <p:attrNameLst>
+                                          <p:attrName>style.visibility</p:attrName>
+                                        </p:attrNameLst>
+                                      </p:cBhvr>
+                                      <p:to>
+                                        <p:strVal val="visible"/>
+                                      </p:to>
+                                    </p:set>
+                                  </p:childTnLst>
+                                </p:cTn>
+                              </p:par>
+                              <p:par>
+                                <p:cTn id="21" presetID="1" presetClass="entr" presetSubtype="0" fill="hold" grpId="0" nodeType="withEffect">
+                                  <p:stCondLst>
+                                    <p:cond delay="0"/>
+                                  </p:stCondLst>
+                                  <p:childTnLst>
+                                    <p:set>
+                                      <p:cBhvr>
+                                        <p:cTn id="22" dur="1" fill="hold">
+                                          <p:stCondLst>
+                                            <p:cond delay="0"/>
+                                          </p:stCondLst>
+                                        </p:cTn>
+                                        <p:tgtEl>
+                                          <p:spTgt spid="13"/>
+                                        </p:tgtEl>
+                                        <p:attrNameLst>
+                                          <p:attrName>style.visibility</p:attrName>
+                                        </p:attrNameLst>
+                                      </p:cBhvr>
+                                      <p:to>
+                                        <p:strVal val="visible"/>
+                                      </p:to>
+                                    </p:set>
+                                  </p:childTnLst>
+                                </p:cTn>
+                              </p:par>
+                              <p:par>
+                                <p:cTn id="23" presetID="1" presetClass="entr" presetSubtype="0" fill="hold" nodeType="withEffect">
+                                  <p:stCondLst>
+                                    <p:cond delay="0"/>
+                                  </p:stCondLst>
+                                  <p:childTnLst>
+                                    <p:set>
+                                      <p:cBhvr>
+                                        <p:cTn id="24" dur="1" fill="hold">
+                                          <p:stCondLst>
+                                            <p:cond delay="0"/>
+                                          </p:stCondLst>
+                                        </p:cTn>
+                                        <p:tgtEl>
+                                          <p:spTgt spid="6"/>
+                                        </p:tgtEl>
+                                        <p:attrNameLst>
+                                          <p:attrName>style.visibility</p:attrName>
+                                        </p:attrNameLst>
+                                      </p:cBhvr>
+                                      <p:to>
+                                        <p:strVal val="visible"/>
+                                      </p:to>
+                                    </p:set>
+                                  </p:childTnLst>
+                                </p:cTn>
+                              </p:par>
+                            </p:childTnLst>
+                          </p:cTn>
+                        </p:par>
+                      </p:childTnLst>
+                    </p:cTn>
+                  </p:par>
+                  <p:par>
+                    <p:cTn id="25" fill="hold">
+                      <p:stCondLst>
+                        <p:cond delay="indefinite"/>
+                      </p:stCondLst>
+                      <p:childTnLst>
+                        <p:par>
+                          <p:cTn id="26" fill="hold">
+                            <p:stCondLst>
+                              <p:cond delay="0"/>
+                            </p:stCondLst>
+                            <p:childTnLst>
+                              <p:par>
+                                <p:cTn id="27" presetID="1" presetClass="entr" presetSubtype="0" fill="hold" grpId="0" nodeType="clickEffect">
+                                  <p:stCondLst>
+                                    <p:cond delay="0"/>
+                                  </p:stCondLst>
+                                  <p:childTnLst>
+                                    <p:set>
+                                      <p:cBhvr>
+                                        <p:cTn id="28" dur="1" fill="hold">
+                                          <p:stCondLst>
+                                            <p:cond delay="0"/>
+                                          </p:stCondLst>
+                                        </p:cTn>
+                                        <p:tgtEl>
+                                          <p:spTgt spid="14"/>
+                                        </p:tgtEl>
+                                        <p:attrNameLst>
+                                          <p:attrName>style.visibility</p:attrName>
+                                        </p:attrNameLst>
+                                      </p:cBhvr>
+                                      <p:to>
+                                        <p:strVal val="visible"/>
+                                      </p:to>
+                                    </p:set>
+                                  </p:childTnLst>
+                                </p:cTn>
+                              </p:par>
+                              <p:par>
+                                <p:cTn id="29" presetID="1" presetClass="entr" presetSubtype="0" fill="hold" nodeType="withEffect">
+                                  <p:stCondLst>
+                                    <p:cond delay="0"/>
+                                  </p:stCondLst>
+                                  <p:childTnLst>
+                                    <p:set>
+                                      <p:cBhvr>
+                                        <p:cTn id="30" dur="1" fill="hold">
+                                          <p:stCondLst>
+                                            <p:cond delay="0"/>
+                                          </p:stCondLst>
+                                        </p:cTn>
+                                        <p:tgtEl>
+                                          <p:spTgt spid="7"/>
+                                        </p:tgtEl>
+                                        <p:attrNameLst>
+                                          <p:attrName>style.visibility</p:attrName>
+                                        </p:attrNameLst>
+                                      </p:cBhvr>
+                                      <p:to>
+                                        <p:strVal val="visible"/>
+                                      </p:to>
+                                    </p:set>
+                                  </p:childTnLst>
+                                </p:cTn>
+                              </p:par>
+                              <p:par>
+                                <p:cTn id="31" presetID="1" presetClass="entr" presetSubtype="0" fill="hold" nodeType="withEffect">
+                                  <p:stCondLst>
+                                    <p:cond delay="0"/>
+                                  </p:stCondLst>
+                                  <p:childTnLst>
+                                    <p:set>
+                                      <p:cBhvr>
+                                        <p:cTn id="32" dur="1" fill="hold">
+                                          <p:stCondLst>
+                                            <p:cond delay="0"/>
+                                          </p:stCondLst>
+                                        </p:cTn>
+                                        <p:tgtEl>
+                                          <p:spTgt spid="11"/>
+                                        </p:tgtEl>
+                                        <p:attrNameLst>
+                                          <p:attrName>style.visibility</p:attrName>
+                                        </p:attrNameLst>
+                                      </p:cBhvr>
+                                      <p:to>
+                                        <p:strVal val="visible"/>
+                                      </p:to>
+                                    </p:set>
+                                  </p:childTnLst>
+                                </p:cTn>
+                              </p:par>
+                            </p:childTnLst>
+                          </p:cTn>
+                        </p:par>
+                      </p:childTnLst>
+                    </p:cTn>
+                  </p:par>
+                </p:childTnLst>
+              </p:cTn>
+              <p:prevCondLst>
+                <p:cond evt="onPrev" delay="0">
+                  <p:tgtEl>
+                    <p:sldTgt/>
+                  </p:tgtEl>
+                </p:cond>
+              </p:prevCondLst>
+              <p:nextCondLst>
+                <p:cond evt="onNext" delay="0">
+                  <p:tgtEl>
+                    <p:sldTgt/>
+                  </p:tgtEl>
+                </p:cond>
+              </p:nextCondLst>
+            </p:seq>
+          </p:childTnLst>
+        </p:cTn>
       </p:par>
     </p:tnLst>
+    <p:bldLst>
+      <p:bldP spid="12" grpId="0"/>
+      <p:bldP spid="13" grpId="0"/>
+      <p:bldP spid="14" grpId="0"/>
+    </p:bldLst>
   </p:timing>
 </p:sld>
 </file>
@@ -19709,9 +20707,406 @@
   <p:timing>
     <p:tnLst>
       <p:par>
-        <p:cTn id="1" dur="indefinite" restart="never" nodeType="tmRoot"/>
+        <p:cTn id="1" dur="indefinite" restart="never" nodeType="tmRoot">
+          <p:childTnLst>
+            <p:seq concurrent="1" nextAc="seek">
+              <p:cTn id="2" dur="indefinite" nodeType="mainSeq">
+                <p:childTnLst>
+                  <p:par>
+                    <p:cTn id="3" fill="hold">
+                      <p:stCondLst>
+                        <p:cond delay="indefinite"/>
+                      </p:stCondLst>
+                      <p:childTnLst>
+                        <p:par>
+                          <p:cTn id="4" fill="hold">
+                            <p:stCondLst>
+                              <p:cond delay="0"/>
+                            </p:stCondLst>
+                            <p:childTnLst>
+                              <p:par>
+                                <p:cTn id="5" presetID="1" presetClass="entr" presetSubtype="0" fill="hold" nodeType="clickEffect">
+                                  <p:stCondLst>
+                                    <p:cond delay="0"/>
+                                  </p:stCondLst>
+                                  <p:childTnLst>
+                                    <p:set>
+                                      <p:cBhvr>
+                                        <p:cTn id="6" dur="1" fill="hold">
+                                          <p:stCondLst>
+                                            <p:cond delay="0"/>
+                                          </p:stCondLst>
+                                        </p:cTn>
+                                        <p:tgtEl>
+                                          <p:spTgt spid="15"/>
+                                        </p:tgtEl>
+                                        <p:attrNameLst>
+                                          <p:attrName>style.visibility</p:attrName>
+                                        </p:attrNameLst>
+                                      </p:cBhvr>
+                                      <p:to>
+                                        <p:strVal val="visible"/>
+                                      </p:to>
+                                    </p:set>
+                                  </p:childTnLst>
+                                </p:cTn>
+                              </p:par>
+                            </p:childTnLst>
+                          </p:cTn>
+                        </p:par>
+                      </p:childTnLst>
+                    </p:cTn>
+                  </p:par>
+                  <p:par>
+                    <p:cTn id="7" fill="hold">
+                      <p:stCondLst>
+                        <p:cond delay="indefinite"/>
+                      </p:stCondLst>
+                      <p:childTnLst>
+                        <p:par>
+                          <p:cTn id="8" fill="hold">
+                            <p:stCondLst>
+                              <p:cond delay="0"/>
+                            </p:stCondLst>
+                            <p:childTnLst>
+                              <p:par>
+                                <p:cTn id="9" presetID="1" presetClass="entr" presetSubtype="0" fill="hold" nodeType="clickEffect">
+                                  <p:stCondLst>
+                                    <p:cond delay="0"/>
+                                  </p:stCondLst>
+                                  <p:childTnLst>
+                                    <p:set>
+                                      <p:cBhvr>
+                                        <p:cTn id="10" dur="1" fill="hold">
+                                          <p:stCondLst>
+                                            <p:cond delay="0"/>
+                                          </p:stCondLst>
+                                        </p:cTn>
+                                        <p:tgtEl>
+                                          <p:spTgt spid="8"/>
+                                        </p:tgtEl>
+                                        <p:attrNameLst>
+                                          <p:attrName>style.visibility</p:attrName>
+                                        </p:attrNameLst>
+                                      </p:cBhvr>
+                                      <p:to>
+                                        <p:strVal val="visible"/>
+                                      </p:to>
+                                    </p:set>
+                                  </p:childTnLst>
+                                </p:cTn>
+                              </p:par>
+                              <p:par>
+                                <p:cTn id="11" presetID="1" presetClass="entr" presetSubtype="0" fill="hold" nodeType="withEffect">
+                                  <p:stCondLst>
+                                    <p:cond delay="0"/>
+                                  </p:stCondLst>
+                                  <p:childTnLst>
+                                    <p:set>
+                                      <p:cBhvr>
+                                        <p:cTn id="12" dur="1" fill="hold">
+                                          <p:stCondLst>
+                                            <p:cond delay="0"/>
+                                          </p:stCondLst>
+                                        </p:cTn>
+                                        <p:tgtEl>
+                                          <p:spTgt spid="9"/>
+                                        </p:tgtEl>
+                                        <p:attrNameLst>
+                                          <p:attrName>style.visibility</p:attrName>
+                                        </p:attrNameLst>
+                                      </p:cBhvr>
+                                      <p:to>
+                                        <p:strVal val="visible"/>
+                                      </p:to>
+                                    </p:set>
+                                  </p:childTnLst>
+                                </p:cTn>
+                              </p:par>
+                              <p:par>
+                                <p:cTn id="13" presetID="1" presetClass="entr" presetSubtype="0" fill="hold" grpId="0" nodeType="withEffect">
+                                  <p:stCondLst>
+                                    <p:cond delay="0"/>
+                                  </p:stCondLst>
+                                  <p:childTnLst>
+                                    <p:set>
+                                      <p:cBhvr>
+                                        <p:cTn id="14" dur="1" fill="hold">
+                                          <p:stCondLst>
+                                            <p:cond delay="0"/>
+                                          </p:stCondLst>
+                                        </p:cTn>
+                                        <p:tgtEl>
+                                          <p:spTgt spid="12"/>
+                                        </p:tgtEl>
+                                        <p:attrNameLst>
+                                          <p:attrName>style.visibility</p:attrName>
+                                        </p:attrNameLst>
+                                      </p:cBhvr>
+                                      <p:to>
+                                        <p:strVal val="visible"/>
+                                      </p:to>
+                                    </p:set>
+                                  </p:childTnLst>
+                                </p:cTn>
+                              </p:par>
+                              <p:par>
+                                <p:cTn id="15" presetID="1" presetClass="entr" presetSubtype="0" fill="hold" nodeType="withEffect">
+                                  <p:stCondLst>
+                                    <p:cond delay="0"/>
+                                  </p:stCondLst>
+                                  <p:childTnLst>
+                                    <p:set>
+                                      <p:cBhvr>
+                                        <p:cTn id="16" dur="1" fill="hold">
+                                          <p:stCondLst>
+                                            <p:cond delay="0"/>
+                                          </p:stCondLst>
+                                        </p:cTn>
+                                        <p:tgtEl>
+                                          <p:spTgt spid="5"/>
+                                        </p:tgtEl>
+                                        <p:attrNameLst>
+                                          <p:attrName>style.visibility</p:attrName>
+                                        </p:attrNameLst>
+                                      </p:cBhvr>
+                                      <p:to>
+                                        <p:strVal val="visible"/>
+                                      </p:to>
+                                    </p:set>
+                                  </p:childTnLst>
+                                </p:cTn>
+                              </p:par>
+                            </p:childTnLst>
+                          </p:cTn>
+                        </p:par>
+                      </p:childTnLst>
+                    </p:cTn>
+                  </p:par>
+                  <p:par>
+                    <p:cTn id="17" fill="hold">
+                      <p:stCondLst>
+                        <p:cond delay="indefinite"/>
+                      </p:stCondLst>
+                      <p:childTnLst>
+                        <p:par>
+                          <p:cTn id="18" fill="hold">
+                            <p:stCondLst>
+                              <p:cond delay="0"/>
+                            </p:stCondLst>
+                            <p:childTnLst>
+                              <p:par>
+                                <p:cTn id="19" presetID="1" presetClass="entr" presetSubtype="0" fill="hold" nodeType="clickEffect">
+                                  <p:stCondLst>
+                                    <p:cond delay="0"/>
+                                  </p:stCondLst>
+                                  <p:childTnLst>
+                                    <p:set>
+                                      <p:cBhvr>
+                                        <p:cTn id="20" dur="1" fill="hold">
+                                          <p:stCondLst>
+                                            <p:cond delay="0"/>
+                                          </p:stCondLst>
+                                        </p:cTn>
+                                        <p:tgtEl>
+                                          <p:spTgt spid="10"/>
+                                        </p:tgtEl>
+                                        <p:attrNameLst>
+                                          <p:attrName>style.visibility</p:attrName>
+                                        </p:attrNameLst>
+                                      </p:cBhvr>
+                                      <p:to>
+                                        <p:strVal val="visible"/>
+                                      </p:to>
+                                    </p:set>
+                                  </p:childTnLst>
+                                </p:cTn>
+                              </p:par>
+                              <p:par>
+                                <p:cTn id="21" presetID="1" presetClass="entr" presetSubtype="0" fill="hold" grpId="0" nodeType="withEffect">
+                                  <p:stCondLst>
+                                    <p:cond delay="0"/>
+                                  </p:stCondLst>
+                                  <p:childTnLst>
+                                    <p:set>
+                                      <p:cBhvr>
+                                        <p:cTn id="22" dur="1" fill="hold">
+                                          <p:stCondLst>
+                                            <p:cond delay="0"/>
+                                          </p:stCondLst>
+                                        </p:cTn>
+                                        <p:tgtEl>
+                                          <p:spTgt spid="13"/>
+                                        </p:tgtEl>
+                                        <p:attrNameLst>
+                                          <p:attrName>style.visibility</p:attrName>
+                                        </p:attrNameLst>
+                                      </p:cBhvr>
+                                      <p:to>
+                                        <p:strVal val="visible"/>
+                                      </p:to>
+                                    </p:set>
+                                  </p:childTnLst>
+                                </p:cTn>
+                              </p:par>
+                              <p:par>
+                                <p:cTn id="23" presetID="1" presetClass="entr" presetSubtype="0" fill="hold" nodeType="withEffect">
+                                  <p:stCondLst>
+                                    <p:cond delay="0"/>
+                                  </p:stCondLst>
+                                  <p:childTnLst>
+                                    <p:set>
+                                      <p:cBhvr>
+                                        <p:cTn id="24" dur="1" fill="hold">
+                                          <p:stCondLst>
+                                            <p:cond delay="0"/>
+                                          </p:stCondLst>
+                                        </p:cTn>
+                                        <p:tgtEl>
+                                          <p:spTgt spid="6"/>
+                                        </p:tgtEl>
+                                        <p:attrNameLst>
+                                          <p:attrName>style.visibility</p:attrName>
+                                        </p:attrNameLst>
+                                      </p:cBhvr>
+                                      <p:to>
+                                        <p:strVal val="visible"/>
+                                      </p:to>
+                                    </p:set>
+                                  </p:childTnLst>
+                                </p:cTn>
+                              </p:par>
+                            </p:childTnLst>
+                          </p:cTn>
+                        </p:par>
+                      </p:childTnLst>
+                    </p:cTn>
+                  </p:par>
+                  <p:par>
+                    <p:cTn id="25" fill="hold">
+                      <p:stCondLst>
+                        <p:cond delay="indefinite"/>
+                      </p:stCondLst>
+                      <p:childTnLst>
+                        <p:par>
+                          <p:cTn id="26" fill="hold">
+                            <p:stCondLst>
+                              <p:cond delay="0"/>
+                            </p:stCondLst>
+                            <p:childTnLst>
+                              <p:par>
+                                <p:cTn id="27" presetID="1" presetClass="entr" presetSubtype="0" fill="hold" grpId="0" nodeType="clickEffect">
+                                  <p:stCondLst>
+                                    <p:cond delay="0"/>
+                                  </p:stCondLst>
+                                  <p:childTnLst>
+                                    <p:set>
+                                      <p:cBhvr>
+                                        <p:cTn id="28" dur="1" fill="hold">
+                                          <p:stCondLst>
+                                            <p:cond delay="0"/>
+                                          </p:stCondLst>
+                                        </p:cTn>
+                                        <p:tgtEl>
+                                          <p:spTgt spid="14"/>
+                                        </p:tgtEl>
+                                        <p:attrNameLst>
+                                          <p:attrName>style.visibility</p:attrName>
+                                        </p:attrNameLst>
+                                      </p:cBhvr>
+                                      <p:to>
+                                        <p:strVal val="visible"/>
+                                      </p:to>
+                                    </p:set>
+                                  </p:childTnLst>
+                                </p:cTn>
+                              </p:par>
+                              <p:par>
+                                <p:cTn id="29" presetID="1" presetClass="entr" presetSubtype="0" fill="hold" nodeType="withEffect">
+                                  <p:stCondLst>
+                                    <p:cond delay="0"/>
+                                  </p:stCondLst>
+                                  <p:childTnLst>
+                                    <p:set>
+                                      <p:cBhvr>
+                                        <p:cTn id="30" dur="1" fill="hold">
+                                          <p:stCondLst>
+                                            <p:cond delay="0"/>
+                                          </p:stCondLst>
+                                        </p:cTn>
+                                        <p:tgtEl>
+                                          <p:spTgt spid="7"/>
+                                        </p:tgtEl>
+                                        <p:attrNameLst>
+                                          <p:attrName>style.visibility</p:attrName>
+                                        </p:attrNameLst>
+                                      </p:cBhvr>
+                                      <p:to>
+                                        <p:strVal val="visible"/>
+                                      </p:to>
+                                    </p:set>
+                                  </p:childTnLst>
+                                </p:cTn>
+                              </p:par>
+                              <p:par>
+                                <p:cTn id="31" presetID="1" presetClass="entr" presetSubtype="0" fill="hold" nodeType="withEffect">
+                                  <p:stCondLst>
+                                    <p:cond delay="0"/>
+                                  </p:stCondLst>
+                                  <p:childTnLst>
+                                    <p:set>
+                                      <p:cBhvr>
+                                        <p:cTn id="32" dur="1" fill="hold">
+                                          <p:stCondLst>
+                                            <p:cond delay="0"/>
+                                          </p:stCondLst>
+                                        </p:cTn>
+                                        <p:tgtEl>
+                                          <p:spTgt spid="11"/>
+                                        </p:tgtEl>
+                                        <p:attrNameLst>
+                                          <p:attrName>style.visibility</p:attrName>
+                                        </p:attrNameLst>
+                                      </p:cBhvr>
+                                      <p:to>
+                                        <p:strVal val="visible"/>
+                                      </p:to>
+                                    </p:set>
+                                  </p:childTnLst>
+                                </p:cTn>
+                              </p:par>
+                            </p:childTnLst>
+                          </p:cTn>
+                        </p:par>
+                      </p:childTnLst>
+                    </p:cTn>
+                  </p:par>
+                </p:childTnLst>
+              </p:cTn>
+              <p:prevCondLst>
+                <p:cond evt="onPrev" delay="0">
+                  <p:tgtEl>
+                    <p:sldTgt/>
+                  </p:tgtEl>
+                </p:cond>
+              </p:prevCondLst>
+              <p:nextCondLst>
+                <p:cond evt="onNext" delay="0">
+                  <p:tgtEl>
+                    <p:sldTgt/>
+                  </p:tgtEl>
+                </p:cond>
+              </p:nextCondLst>
+            </p:seq>
+          </p:childTnLst>
+        </p:cTn>
       </p:par>
     </p:tnLst>
+    <p:bldLst>
+      <p:bldP spid="12" grpId="0"/>
+      <p:bldP spid="13" grpId="0"/>
+      <p:bldP spid="14" grpId="0"/>
+    </p:bldLst>
   </p:timing>
 </p:sld>
 </file>

</xml_diff>

<commit_message>
Updated slides and ran through section multiple times (approx 20)
</commit_message>
<xml_diff>
--- a/Images/Presentation/ImageReconstruction.pptx
+++ b/Images/Presentation/ImageReconstruction.pptx
@@ -361,7 +361,7 @@
           <a:p>
             <a:fld id="{D02EB887-C900-4FB3-9D2F-381B31F1A1AF}" type="datetimeFigureOut">
               <a:rPr lang="en-US" smtClean="0"/>
-              <a:t>4/23/2017</a:t>
+              <a:t>4/24/17</a:t>
             </a:fld>
             <a:endParaRPr lang="en-US"/>
           </a:p>
@@ -531,7 +531,7 @@
           <a:p>
             <a:fld id="{D02EB887-C900-4FB3-9D2F-381B31F1A1AF}" type="datetimeFigureOut">
               <a:rPr lang="en-US" smtClean="0"/>
-              <a:t>4/23/2017</a:t>
+              <a:t>4/24/17</a:t>
             </a:fld>
             <a:endParaRPr lang="en-US"/>
           </a:p>
@@ -711,7 +711,7 @@
           <a:p>
             <a:fld id="{D02EB887-C900-4FB3-9D2F-381B31F1A1AF}" type="datetimeFigureOut">
               <a:rPr lang="en-US" smtClean="0"/>
-              <a:t>4/23/2017</a:t>
+              <a:t>4/24/17</a:t>
             </a:fld>
             <a:endParaRPr lang="en-US"/>
           </a:p>
@@ -881,7 +881,7 @@
           <a:p>
             <a:fld id="{D02EB887-C900-4FB3-9D2F-381B31F1A1AF}" type="datetimeFigureOut">
               <a:rPr lang="en-US" smtClean="0"/>
-              <a:t>4/23/2017</a:t>
+              <a:t>4/24/17</a:t>
             </a:fld>
             <a:endParaRPr lang="en-US"/>
           </a:p>
@@ -1127,7 +1127,7 @@
           <a:p>
             <a:fld id="{D02EB887-C900-4FB3-9D2F-381B31F1A1AF}" type="datetimeFigureOut">
               <a:rPr lang="en-US" smtClean="0"/>
-              <a:t>4/23/2017</a:t>
+              <a:t>4/24/17</a:t>
             </a:fld>
             <a:endParaRPr lang="en-US"/>
           </a:p>
@@ -1415,7 +1415,7 @@
           <a:p>
             <a:fld id="{D02EB887-C900-4FB3-9D2F-381B31F1A1AF}" type="datetimeFigureOut">
               <a:rPr lang="en-US" smtClean="0"/>
-              <a:t>4/23/2017</a:t>
+              <a:t>4/24/17</a:t>
             </a:fld>
             <a:endParaRPr lang="en-US"/>
           </a:p>
@@ -1837,7 +1837,7 @@
           <a:p>
             <a:fld id="{D02EB887-C900-4FB3-9D2F-381B31F1A1AF}" type="datetimeFigureOut">
               <a:rPr lang="en-US" smtClean="0"/>
-              <a:t>4/23/2017</a:t>
+              <a:t>4/24/17</a:t>
             </a:fld>
             <a:endParaRPr lang="en-US"/>
           </a:p>
@@ -1955,7 +1955,7 @@
           <a:p>
             <a:fld id="{D02EB887-C900-4FB3-9D2F-381B31F1A1AF}" type="datetimeFigureOut">
               <a:rPr lang="en-US" smtClean="0"/>
-              <a:t>4/23/2017</a:t>
+              <a:t>4/24/17</a:t>
             </a:fld>
             <a:endParaRPr lang="en-US"/>
           </a:p>
@@ -2050,7 +2050,7 @@
           <a:p>
             <a:fld id="{D02EB887-C900-4FB3-9D2F-381B31F1A1AF}" type="datetimeFigureOut">
               <a:rPr lang="en-US" smtClean="0"/>
-              <a:t>4/23/2017</a:t>
+              <a:t>4/24/17</a:t>
             </a:fld>
             <a:endParaRPr lang="en-US"/>
           </a:p>
@@ -2327,7 +2327,7 @@
           <a:p>
             <a:fld id="{D02EB887-C900-4FB3-9D2F-381B31F1A1AF}" type="datetimeFigureOut">
               <a:rPr lang="en-US" smtClean="0"/>
-              <a:t>4/23/2017</a:t>
+              <a:t>4/24/17</a:t>
             </a:fld>
             <a:endParaRPr lang="en-US"/>
           </a:p>
@@ -2580,7 +2580,7 @@
           <a:p>
             <a:fld id="{D02EB887-C900-4FB3-9D2F-381B31F1A1AF}" type="datetimeFigureOut">
               <a:rPr lang="en-US" smtClean="0"/>
-              <a:t>4/23/2017</a:t>
+              <a:t>4/24/17</a:t>
             </a:fld>
             <a:endParaRPr lang="en-US"/>
           </a:p>
@@ -2793,7 +2793,7 @@
           <a:p>
             <a:fld id="{D02EB887-C900-4FB3-9D2F-381B31F1A1AF}" type="datetimeFigureOut">
               <a:rPr lang="en-US" smtClean="0"/>
-              <a:t>4/23/2017</a:t>
+              <a:t>4/24/17</a:t>
             </a:fld>
             <a:endParaRPr lang="en-US"/>
           </a:p>
@@ -3507,7 +3507,15 @@
           <a:p>
             <a:r>
               <a:rPr lang="en-US" dirty="0" smtClean="0"/>
-              <a:t>Complement to the skeletonizing</a:t>
+              <a:t> Addition to </a:t>
+            </a:r>
+            <a:r>
+              <a:rPr lang="en-US" dirty="0" smtClean="0"/>
+              <a:t>the </a:t>
+            </a:r>
+            <a:r>
+              <a:rPr lang="en-US" dirty="0" smtClean="0"/>
+              <a:t>skeleton</a:t>
             </a:r>
             <a:endParaRPr lang="en-US" dirty="0"/>
           </a:p>
@@ -3550,7 +3558,7 @@
                               <a:solidFill>
                                 <a:prstClr val="black"/>
                               </a:solidFill>
-                              <a:latin typeface="Cambria Math" panose="02040503050406030204" pitchFamily="18" charset="0"/>
+                              <a:latin typeface="Cambria Math" charset="0"/>
                               <a:ea typeface="Cambria Math" charset="0"/>
                               <a:cs typeface="Cambria Math" charset="0"/>
                             </a:rPr>
@@ -3740,7 +3748,7 @@
                               <a:solidFill>
                                 <a:prstClr val="black"/>
                               </a:solidFill>
-                              <a:latin typeface="Cambria Math" panose="02040503050406030204" pitchFamily="18" charset="0"/>
+                              <a:latin typeface="Cambria Math" charset="0"/>
                               <a:ea typeface="Cambria Math" charset="0"/>
                               <a:cs typeface="Cambria Math" charset="0"/>
                             </a:rPr>
@@ -3792,7 +3800,7 @@
                               <a:solidFill>
                                 <a:prstClr val="black"/>
                               </a:solidFill>
-                              <a:latin typeface="Cambria Math" panose="02040503050406030204" pitchFamily="18" charset="0"/>
+                              <a:latin typeface="Cambria Math" charset="0"/>
                               <a:ea typeface="Cambria Math" charset="0"/>
                               <a:cs typeface="Cambria Math" charset="0"/>
                             </a:rPr>
@@ -3846,7 +3854,7 @@
                                   <a:solidFill>
                                     <a:prstClr val="black"/>
                                   </a:solidFill>
-                                  <a:latin typeface="Cambria Math" panose="02040503050406030204" pitchFamily="18" charset="0"/>
+                                  <a:latin typeface="Cambria Math" charset="0"/>
                                   <a:ea typeface="Cambria Math" charset="0"/>
                                   <a:cs typeface="Cambria Math" charset="0"/>
                                 </a:rPr>
@@ -3860,7 +3868,7 @@
                                       <a:solidFill>
                                         <a:prstClr val="black"/>
                                       </a:solidFill>
-                                      <a:latin typeface="Cambria Math" panose="02040503050406030204" pitchFamily="18" charset="0"/>
+                                      <a:latin typeface="Cambria Math" charset="0"/>
                                       <a:ea typeface="Cambria Math" charset="0"/>
                                       <a:cs typeface="Cambria Math" charset="0"/>
                                     </a:rPr>
@@ -3910,7 +3918,7 @@
                                       <a:solidFill>
                                         <a:prstClr val="black"/>
                                       </a:solidFill>
-                                      <a:latin typeface="Cambria Math" panose="02040503050406030204" pitchFamily="18" charset="0"/>
+                                      <a:latin typeface="Cambria Math" charset="0"/>
                                       <a:ea typeface="Cambria Math"/>
                                     </a:rPr>
                                   </m:ctrlPr>
@@ -4035,7 +4043,7 @@
                               <a:solidFill>
                                 <a:prstClr val="black"/>
                               </a:solidFill>
-                              <a:latin typeface="Cambria Math" panose="02040503050406030204" pitchFamily="18" charset="0"/>
+                              <a:latin typeface="Cambria Math" charset="0"/>
                               <a:ea typeface="Cambria Math" charset="0"/>
                               <a:cs typeface="Cambria Math" charset="0"/>
                             </a:rPr>
@@ -4086,7 +4094,7 @@
                               <a:solidFill>
                                 <a:prstClr val="black"/>
                               </a:solidFill>
-                              <a:latin typeface="Cambria Math" panose="02040503050406030204" pitchFamily="18" charset="0"/>
+                              <a:latin typeface="Cambria Math" charset="0"/>
                               <a:ea typeface="Cambria Math" charset="0"/>
                               <a:cs typeface="Cambria Math" charset="0"/>
                             </a:rPr>
@@ -4126,7 +4134,7 @@
                               <a:solidFill>
                                 <a:prstClr val="black"/>
                               </a:solidFill>
-                              <a:latin typeface="Cambria Math" panose="02040503050406030204" pitchFamily="18" charset="0"/>
+                              <a:latin typeface="Cambria Math" charset="0"/>
                               <a:ea typeface="Cambria Math" charset="0"/>
                               <a:cs typeface="Cambria Math" charset="0"/>
                             </a:rPr>
@@ -4261,7 +4269,7 @@
                               <a:solidFill>
                                 <a:prstClr val="black"/>
                               </a:solidFill>
-                              <a:latin typeface="Cambria Math" panose="02040503050406030204" pitchFamily="18" charset="0"/>
+                              <a:latin typeface="Cambria Math" charset="0"/>
                               <a:ea typeface="Cambria Math" charset="0"/>
                               <a:cs typeface="Cambria Math" charset="0"/>
                             </a:rPr>
@@ -4312,7 +4320,7 @@
                               <a:solidFill>
                                 <a:prstClr val="black"/>
                               </a:solidFill>
-                              <a:latin typeface="Cambria Math" panose="02040503050406030204" pitchFamily="18" charset="0"/>
+                              <a:latin typeface="Cambria Math" charset="0"/>
                               <a:ea typeface="Cambria Math" charset="0"/>
                               <a:cs typeface="Cambria Math" charset="0"/>
                             </a:rPr>
@@ -4326,7 +4334,7 @@
                                   <a:solidFill>
                                     <a:prstClr val="black"/>
                                   </a:solidFill>
-                                  <a:latin typeface="Cambria Math" panose="02040503050406030204" pitchFamily="18" charset="0"/>
+                                  <a:latin typeface="Cambria Math" charset="0"/>
                                   <a:ea typeface="Cambria Math" charset="0"/>
                                   <a:cs typeface="Cambria Math" charset="0"/>
                                 </a:rPr>
@@ -4457,7 +4465,7 @@
       </mc:AlternateContent>
       <p:pic>
         <p:nvPicPr>
-          <p:cNvPr id="12" name="Picture 11"/>
+          <p:cNvPr id="4" name="Picture 3"/>
           <p:cNvPicPr>
             <a:picLocks noChangeAspect="1"/>
           </p:cNvPicPr>
@@ -4477,8 +4485,38 @@
         </p:blipFill>
         <p:spPr>
           <a:xfrm>
-            <a:off x="7391400" y="3059668"/>
-            <a:ext cx="2709423" cy="2819400"/>
+            <a:off x="6108843" y="2275553"/>
+            <a:ext cx="2424834" cy="3149600"/>
+          </a:xfrm>
+          <a:prstGeom prst="rect">
+            <a:avLst/>
+          </a:prstGeom>
+        </p:spPr>
+      </p:pic>
+      <p:pic>
+        <p:nvPicPr>
+          <p:cNvPr id="5" name="Picture 4"/>
+          <p:cNvPicPr>
+            <a:picLocks noChangeAspect="1"/>
+          </p:cNvPicPr>
+          <p:nvPr/>
+        </p:nvPicPr>
+        <p:blipFill>
+          <a:blip r:embed="rId7">
+            <a:extLst>
+              <a:ext uri="{28A0092B-C50C-407E-A947-70E740481C1C}">
+                <a14:useLocalDpi xmlns:a14="http://schemas.microsoft.com/office/drawing/2010/main" val="0"/>
+              </a:ext>
+            </a:extLst>
+          </a:blip>
+          <a:stretch>
+            <a:fillRect/>
+          </a:stretch>
+        </p:blipFill>
+        <p:spPr>
+          <a:xfrm>
+            <a:off x="8763000" y="2275553"/>
+            <a:ext cx="1114495" cy="1400027"/>
           </a:xfrm>
           <a:prstGeom prst="rect">
             <a:avLst/>
@@ -4675,7 +4713,7 @@
                       <m:sSubSupPr>
                         <m:ctrlPr>
                           <a:rPr lang="en-US" sz="3600" i="1" smtClean="0">
-                            <a:latin typeface="Cambria Math" panose="02040503050406030204" pitchFamily="18" charset="0"/>
+                            <a:latin typeface="Cambria Math" charset="0"/>
                           </a:rPr>
                         </m:ctrlPr>
                       </m:sSubSupPr>
@@ -4708,7 +4746,7 @@
                       <m:dPr>
                         <m:ctrlPr>
                           <a:rPr lang="en-US" sz="3600" i="1" smtClean="0">
-                            <a:latin typeface="Cambria Math" panose="02040503050406030204" pitchFamily="18" charset="0"/>
+                            <a:latin typeface="Cambria Math" charset="0"/>
                           </a:rPr>
                         </m:ctrlPr>
                       </m:dPr>
@@ -4731,7 +4769,7 @@
                       <m:dPr>
                         <m:ctrlPr>
                           <a:rPr lang="en-US" sz="3600" b="0" i="1" smtClean="0">
-                            <a:latin typeface="Cambria Math" panose="02040503050406030204" pitchFamily="18" charset="0"/>
+                            <a:latin typeface="Cambria Math" charset="0"/>
                           </a:rPr>
                         </m:ctrlPr>
                       </m:dPr>
@@ -4755,7 +4793,7 @@
                             <m:supHide m:val="on"/>
                             <m:ctrlPr>
                               <a:rPr lang="en-US" sz="3600" b="0" i="1" smtClean="0">
-                                <a:latin typeface="Cambria Math" panose="02040503050406030204" pitchFamily="18" charset="0"/>
+                                <a:latin typeface="Cambria Math" charset="0"/>
                                 <a:ea typeface="Cambria Math" panose="02040503050406030204" pitchFamily="18" charset="0"/>
                               </a:rPr>
                             </m:ctrlPr>
@@ -5071,7 +5109,7 @@
                         <m:sSubSupPr>
                           <m:ctrlPr>
                             <a:rPr lang="en-US" i="1">
-                              <a:latin typeface="Cambria Math" panose="02040503050406030204" pitchFamily="18" charset="0"/>
+                              <a:latin typeface="Cambria Math" charset="0"/>
                             </a:rPr>
                           </m:ctrlPr>
                         </m:sSubSupPr>
@@ -5116,7 +5154,7 @@
                         <m:dPr>
                           <m:ctrlPr>
                             <a:rPr lang="en-US" i="1">
-                              <a:latin typeface="Cambria Math" panose="02040503050406030204" pitchFamily="18" charset="0"/>
+                              <a:latin typeface="Cambria Math" charset="0"/>
                             </a:rPr>
                           </m:ctrlPr>
                         </m:dPr>
@@ -5139,7 +5177,7 @@
                         <m:sSubSupPr>
                           <m:ctrlPr>
                             <a:rPr lang="en-US" i="1">
-                              <a:latin typeface="Cambria Math" panose="02040503050406030204" pitchFamily="18" charset="0"/>
+                              <a:latin typeface="Cambria Math" charset="0"/>
                             </a:rPr>
                           </m:ctrlPr>
                         </m:sSubSupPr>
@@ -5174,7 +5212,7 @@
                           <m:endChr m:val="]"/>
                           <m:ctrlPr>
                             <a:rPr lang="en-US" i="1">
-                              <a:latin typeface="Cambria Math" panose="02040503050406030204" pitchFamily="18" charset="0"/>
+                              <a:latin typeface="Cambria Math" charset="0"/>
                             </a:rPr>
                           </m:ctrlPr>
                         </m:dPr>
@@ -5183,7 +5221,7 @@
                             <m:sSubSupPr>
                               <m:ctrlPr>
                                 <a:rPr lang="en-US" i="1">
-                                  <a:latin typeface="Cambria Math" panose="02040503050406030204" pitchFamily="18" charset="0"/>
+                                  <a:latin typeface="Cambria Math" charset="0"/>
                                 </a:rPr>
                               </m:ctrlPr>
                             </m:sSubSupPr>
@@ -5228,7 +5266,7 @@
                             <m:dPr>
                               <m:ctrlPr>
                                 <a:rPr lang="en-US" i="1">
-                                  <a:latin typeface="Cambria Math" panose="02040503050406030204" pitchFamily="18" charset="0"/>
+                                  <a:latin typeface="Cambria Math" charset="0"/>
                                 </a:rPr>
                               </m:ctrlPr>
                             </m:dPr>
@@ -5629,7 +5667,7 @@
                           <m:sSubSupPr>
                             <m:ctrlPr>
                               <a:rPr lang="en-US" i="1" smtClean="0">
-                                <a:latin typeface="Cambria Math" panose="02040503050406030204" pitchFamily="18" charset="0"/>
+                                <a:latin typeface="Cambria Math" charset="0"/>
                               </a:rPr>
                             </m:ctrlPr>
                           </m:sSubSupPr>
@@ -5662,7 +5700,7 @@
                           <m:dPr>
                             <m:ctrlPr>
                               <a:rPr lang="en-US" i="1" smtClean="0">
-                                <a:latin typeface="Cambria Math" panose="02040503050406030204" pitchFamily="18" charset="0"/>
+                                <a:latin typeface="Cambria Math" charset="0"/>
                               </a:rPr>
                             </m:ctrlPr>
                           </m:dPr>
@@ -6342,7 +6380,7 @@
                       <m:sSubSupPr>
                         <m:ctrlPr>
                           <a:rPr lang="en-US" sz="4000" i="1" smtClean="0">
-                            <a:latin typeface="Cambria Math" panose="02040503050406030204" pitchFamily="18" charset="0"/>
+                            <a:latin typeface="Cambria Math" charset="0"/>
                           </a:rPr>
                         </m:ctrlPr>
                       </m:sSubSupPr>
@@ -6375,7 +6413,7 @@
                       <m:dPr>
                         <m:ctrlPr>
                           <a:rPr lang="en-US" sz="4000" i="1" smtClean="0">
-                            <a:latin typeface="Cambria Math" panose="02040503050406030204" pitchFamily="18" charset="0"/>
+                            <a:latin typeface="Cambria Math" charset="0"/>
                           </a:rPr>
                         </m:ctrlPr>
                       </m:dPr>
@@ -6398,7 +6436,7 @@
                       <m:sSubSupPr>
                         <m:ctrlPr>
                           <a:rPr lang="en-US" sz="4000" b="0" i="1" smtClean="0">
-                            <a:latin typeface="Cambria Math" panose="02040503050406030204" pitchFamily="18" charset="0"/>
+                            <a:latin typeface="Cambria Math" charset="0"/>
                           </a:rPr>
                         </m:ctrlPr>
                       </m:sSubSupPr>
@@ -6423,7 +6461,7 @@
                           <m:dPr>
                             <m:ctrlPr>
                               <a:rPr lang="en-US" sz="4000" b="0" i="1" smtClean="0">
-                                <a:latin typeface="Cambria Math" panose="02040503050406030204" pitchFamily="18" charset="0"/>
+                                <a:latin typeface="Cambria Math" charset="0"/>
                               </a:rPr>
                             </m:ctrlPr>
                           </m:dPr>
@@ -6442,7 +6480,7 @@
                       <m:dPr>
                         <m:ctrlPr>
                           <a:rPr lang="en-US" sz="4000" b="0" i="1" smtClean="0">
-                            <a:latin typeface="Cambria Math" panose="02040503050406030204" pitchFamily="18" charset="0"/>
+                            <a:latin typeface="Cambria Math" charset="0"/>
                           </a:rPr>
                         </m:ctrlPr>
                       </m:dPr>
@@ -6578,7 +6616,7 @@
                           <m:sSubSupPr>
                             <m:ctrlPr>
                               <a:rPr lang="en-US" i="1" smtClean="0">
-                                <a:latin typeface="Cambria Math" panose="02040503050406030204" pitchFamily="18" charset="0"/>
+                                <a:latin typeface="Cambria Math" charset="0"/>
                               </a:rPr>
                             </m:ctrlPr>
                           </m:sSubSupPr>
@@ -6611,7 +6649,7 @@
                           <m:dPr>
                             <m:ctrlPr>
                               <a:rPr lang="en-US" i="1" smtClean="0">
-                                <a:latin typeface="Cambria Math" panose="02040503050406030204" pitchFamily="18" charset="0"/>
+                                <a:latin typeface="Cambria Math" charset="0"/>
                               </a:rPr>
                             </m:ctrlPr>
                           </m:dPr>
@@ -6839,7 +6877,7 @@
                           <m:sSubSupPr>
                             <m:ctrlPr>
                               <a:rPr lang="en-US" i="1" smtClean="0">
-                                <a:latin typeface="Cambria Math" panose="02040503050406030204" pitchFamily="18" charset="0"/>
+                                <a:latin typeface="Cambria Math" charset="0"/>
                               </a:rPr>
                             </m:ctrlPr>
                           </m:sSubSupPr>
@@ -6884,7 +6922,7 @@
                           <m:dPr>
                             <m:ctrlPr>
                               <a:rPr lang="en-US" i="1" smtClean="0">
-                                <a:latin typeface="Cambria Math" panose="02040503050406030204" pitchFamily="18" charset="0"/>
+                                <a:latin typeface="Cambria Math" charset="0"/>
                               </a:rPr>
                             </m:ctrlPr>
                           </m:dPr>
@@ -7024,7 +7062,7 @@
                           <m:sSubSupPr>
                             <m:ctrlPr>
                               <a:rPr lang="en-US" i="1" smtClean="0">
-                                <a:latin typeface="Cambria Math" panose="02040503050406030204" pitchFamily="18" charset="0"/>
+                                <a:latin typeface="Cambria Math" charset="0"/>
                               </a:rPr>
                             </m:ctrlPr>
                           </m:sSubSupPr>
@@ -7069,7 +7107,7 @@
                           <m:dPr>
                             <m:ctrlPr>
                               <a:rPr lang="en-US" i="1" smtClean="0">
-                                <a:latin typeface="Cambria Math" panose="02040503050406030204" pitchFamily="18" charset="0"/>
+                                <a:latin typeface="Cambria Math" charset="0"/>
                               </a:rPr>
                             </m:ctrlPr>
                           </m:dPr>
@@ -7209,7 +7247,7 @@
                           <m:sSubSupPr>
                             <m:ctrlPr>
                               <a:rPr lang="en-US" i="1" smtClean="0">
-                                <a:latin typeface="Cambria Math" panose="02040503050406030204" pitchFamily="18" charset="0"/>
+                                <a:latin typeface="Cambria Math" charset="0"/>
                               </a:rPr>
                             </m:ctrlPr>
                           </m:sSubSupPr>
@@ -7254,7 +7292,7 @@
                           <m:dPr>
                             <m:ctrlPr>
                               <a:rPr lang="en-US" i="1" smtClean="0">
-                                <a:latin typeface="Cambria Math" panose="02040503050406030204" pitchFamily="18" charset="0"/>
+                                <a:latin typeface="Cambria Math" charset="0"/>
                               </a:rPr>
                             </m:ctrlPr>
                           </m:dPr>
@@ -7394,7 +7432,7 @@
                           <m:sSubSupPr>
                             <m:ctrlPr>
                               <a:rPr lang="en-US" i="1" smtClean="0">
-                                <a:latin typeface="Cambria Math" panose="02040503050406030204" pitchFamily="18" charset="0"/>
+                                <a:latin typeface="Cambria Math" charset="0"/>
                               </a:rPr>
                             </m:ctrlPr>
                           </m:sSubSupPr>
@@ -7439,7 +7477,7 @@
                           <m:dPr>
                             <m:ctrlPr>
                               <a:rPr lang="en-US" i="1" smtClean="0">
-                                <a:latin typeface="Cambria Math" panose="02040503050406030204" pitchFamily="18" charset="0"/>
+                                <a:latin typeface="Cambria Math" charset="0"/>
                               </a:rPr>
                             </m:ctrlPr>
                           </m:dPr>
@@ -7579,7 +7617,7 @@
                           <m:sSubSupPr>
                             <m:ctrlPr>
                               <a:rPr lang="en-US" i="1" smtClean="0">
-                                <a:latin typeface="Cambria Math" panose="02040503050406030204" pitchFamily="18" charset="0"/>
+                                <a:latin typeface="Cambria Math" charset="0"/>
                               </a:rPr>
                             </m:ctrlPr>
                           </m:sSubSupPr>
@@ -7624,7 +7662,7 @@
                           <m:dPr>
                             <m:ctrlPr>
                               <a:rPr lang="en-US" i="1" smtClean="0">
-                                <a:latin typeface="Cambria Math" panose="02040503050406030204" pitchFamily="18" charset="0"/>
+                                <a:latin typeface="Cambria Math" charset="0"/>
                               </a:rPr>
                             </m:ctrlPr>
                           </m:dPr>
@@ -8457,7 +8495,7 @@
                       <m:sSubSupPr>
                         <m:ctrlPr>
                           <a:rPr lang="en-US" sz="3600" i="1" smtClean="0">
-                            <a:latin typeface="Cambria Math" panose="02040503050406030204" pitchFamily="18" charset="0"/>
+                            <a:latin typeface="Cambria Math" charset="0"/>
                           </a:rPr>
                         </m:ctrlPr>
                       </m:sSubSupPr>
@@ -8490,7 +8528,7 @@
                       <m:dPr>
                         <m:ctrlPr>
                           <a:rPr lang="en-US" sz="3600" i="1" smtClean="0">
-                            <a:latin typeface="Cambria Math" panose="02040503050406030204" pitchFamily="18" charset="0"/>
+                            <a:latin typeface="Cambria Math" charset="0"/>
                           </a:rPr>
                         </m:ctrlPr>
                       </m:dPr>
@@ -8513,7 +8551,7 @@
                       <m:dPr>
                         <m:ctrlPr>
                           <a:rPr lang="en-US" sz="3600" b="0" i="1" smtClean="0">
-                            <a:latin typeface="Cambria Math" panose="02040503050406030204" pitchFamily="18" charset="0"/>
+                            <a:latin typeface="Cambria Math" charset="0"/>
                           </a:rPr>
                         </m:ctrlPr>
                       </m:dPr>
@@ -8827,7 +8865,7 @@
                         <m:sSubSupPr>
                           <m:ctrlPr>
                             <a:rPr lang="en-US" sz="3000" i="1" smtClean="0">
-                              <a:latin typeface="Cambria Math" panose="02040503050406030204" pitchFamily="18" charset="0"/>
+                              <a:latin typeface="Cambria Math" charset="0"/>
                             </a:rPr>
                           </m:ctrlPr>
                         </m:sSubSupPr>
@@ -8872,7 +8910,7 @@
                         <m:dPr>
                           <m:ctrlPr>
                             <a:rPr lang="en-US" sz="3000" i="1">
-                              <a:latin typeface="Cambria Math" panose="02040503050406030204" pitchFamily="18" charset="0"/>
+                              <a:latin typeface="Cambria Math" charset="0"/>
                             </a:rPr>
                           </m:ctrlPr>
                         </m:dPr>
@@ -8895,7 +8933,7 @@
                         <m:sSubSupPr>
                           <m:ctrlPr>
                             <a:rPr lang="en-US" sz="3000" i="1">
-                              <a:latin typeface="Cambria Math" panose="02040503050406030204" pitchFamily="18" charset="0"/>
+                              <a:latin typeface="Cambria Math" charset="0"/>
                             </a:rPr>
                           </m:ctrlPr>
                         </m:sSubSupPr>
@@ -8930,7 +8968,7 @@
                           <m:endChr m:val="]"/>
                           <m:ctrlPr>
                             <a:rPr lang="en-US" sz="3000" i="1">
-                              <a:latin typeface="Cambria Math" panose="02040503050406030204" pitchFamily="18" charset="0"/>
+                              <a:latin typeface="Cambria Math" charset="0"/>
                             </a:rPr>
                           </m:ctrlPr>
                         </m:dPr>
@@ -8939,7 +8977,7 @@
                             <m:sSubSupPr>
                               <m:ctrlPr>
                                 <a:rPr lang="en-US" sz="3000" i="1">
-                                  <a:latin typeface="Cambria Math" panose="02040503050406030204" pitchFamily="18" charset="0"/>
+                                  <a:latin typeface="Cambria Math" charset="0"/>
                                 </a:rPr>
                               </m:ctrlPr>
                             </m:sSubSupPr>
@@ -8984,7 +9022,7 @@
                             <m:dPr>
                               <m:ctrlPr>
                                 <a:rPr lang="en-US" sz="3000" i="1">
-                                  <a:latin typeface="Cambria Math" panose="02040503050406030204" pitchFamily="18" charset="0"/>
+                                  <a:latin typeface="Cambria Math" charset="0"/>
                                 </a:rPr>
                               </m:ctrlPr>
                             </m:dPr>
@@ -9385,7 +9423,7 @@
                           <m:sSubSupPr>
                             <m:ctrlPr>
                               <a:rPr lang="en-US" i="1" smtClean="0">
-                                <a:latin typeface="Cambria Math" panose="02040503050406030204" pitchFamily="18" charset="0"/>
+                                <a:latin typeface="Cambria Math" charset="0"/>
                               </a:rPr>
                             </m:ctrlPr>
                           </m:sSubSupPr>
@@ -9418,7 +9456,7 @@
                           <m:dPr>
                             <m:ctrlPr>
                               <a:rPr lang="en-US" i="1" smtClean="0">
-                                <a:latin typeface="Cambria Math" panose="02040503050406030204" pitchFamily="18" charset="0"/>
+                                <a:latin typeface="Cambria Math" charset="0"/>
                               </a:rPr>
                             </m:ctrlPr>
                           </m:dPr>
@@ -10095,7 +10133,7 @@
                       <m:sSubSupPr>
                         <m:ctrlPr>
                           <a:rPr lang="en-US" sz="4000" i="1" smtClean="0">
-                            <a:latin typeface="Cambria Math" panose="02040503050406030204" pitchFamily="18" charset="0"/>
+                            <a:latin typeface="Cambria Math" charset="0"/>
                           </a:rPr>
                         </m:ctrlPr>
                       </m:sSubSupPr>
@@ -10128,7 +10166,7 @@
                       <m:dPr>
                         <m:ctrlPr>
                           <a:rPr lang="en-US" sz="4000" i="1" smtClean="0">
-                            <a:latin typeface="Cambria Math" panose="02040503050406030204" pitchFamily="18" charset="0"/>
+                            <a:latin typeface="Cambria Math" charset="0"/>
                           </a:rPr>
                         </m:ctrlPr>
                       </m:dPr>
@@ -10151,7 +10189,7 @@
                       <m:sSubSupPr>
                         <m:ctrlPr>
                           <a:rPr lang="en-US" sz="4000" b="0" i="1" smtClean="0">
-                            <a:latin typeface="Cambria Math" panose="02040503050406030204" pitchFamily="18" charset="0"/>
+                            <a:latin typeface="Cambria Math" charset="0"/>
                           </a:rPr>
                         </m:ctrlPr>
                       </m:sSubSupPr>
@@ -10176,7 +10214,7 @@
                           <m:dPr>
                             <m:ctrlPr>
                               <a:rPr lang="en-US" sz="4000" b="0" i="1" smtClean="0">
-                                <a:latin typeface="Cambria Math" panose="02040503050406030204" pitchFamily="18" charset="0"/>
+                                <a:latin typeface="Cambria Math" charset="0"/>
                               </a:rPr>
                             </m:ctrlPr>
                           </m:dPr>
@@ -10195,7 +10233,7 @@
                       <m:dPr>
                         <m:ctrlPr>
                           <a:rPr lang="en-US" sz="4000" b="0" i="1" smtClean="0">
-                            <a:latin typeface="Cambria Math" panose="02040503050406030204" pitchFamily="18" charset="0"/>
+                            <a:latin typeface="Cambria Math" charset="0"/>
                           </a:rPr>
                         </m:ctrlPr>
                       </m:dPr>
@@ -10328,7 +10366,7 @@
                           <m:sSubSupPr>
                             <m:ctrlPr>
                               <a:rPr lang="en-US" i="1" smtClean="0">
-                                <a:latin typeface="Cambria Math" panose="02040503050406030204" pitchFamily="18" charset="0"/>
+                                <a:latin typeface="Cambria Math" charset="0"/>
                               </a:rPr>
                             </m:ctrlPr>
                           </m:sSubSupPr>
@@ -10361,7 +10399,7 @@
                           <m:dPr>
                             <m:ctrlPr>
                               <a:rPr lang="en-US" i="1" smtClean="0">
-                                <a:latin typeface="Cambria Math" panose="02040503050406030204" pitchFamily="18" charset="0"/>
+                                <a:latin typeface="Cambria Math" charset="0"/>
                               </a:rPr>
                             </m:ctrlPr>
                           </m:dPr>
@@ -10589,7 +10627,7 @@
                           <m:sSubSupPr>
                             <m:ctrlPr>
                               <a:rPr lang="en-US" i="1" smtClean="0">
-                                <a:latin typeface="Cambria Math" panose="02040503050406030204" pitchFamily="18" charset="0"/>
+                                <a:latin typeface="Cambria Math" charset="0"/>
                               </a:rPr>
                             </m:ctrlPr>
                           </m:sSubSupPr>
@@ -10634,7 +10672,7 @@
                           <m:dPr>
                             <m:ctrlPr>
                               <a:rPr lang="en-US" i="1" smtClean="0">
-                                <a:latin typeface="Cambria Math" panose="02040503050406030204" pitchFamily="18" charset="0"/>
+                                <a:latin typeface="Cambria Math" charset="0"/>
                               </a:rPr>
                             </m:ctrlPr>
                           </m:dPr>
@@ -10774,7 +10812,7 @@
                           <m:sSubSupPr>
                             <m:ctrlPr>
                               <a:rPr lang="en-US" i="1" smtClean="0">
-                                <a:latin typeface="Cambria Math" panose="02040503050406030204" pitchFamily="18" charset="0"/>
+                                <a:latin typeface="Cambria Math" charset="0"/>
                               </a:rPr>
                             </m:ctrlPr>
                           </m:sSubSupPr>
@@ -10819,7 +10857,7 @@
                           <m:dPr>
                             <m:ctrlPr>
                               <a:rPr lang="en-US" i="1" smtClean="0">
-                                <a:latin typeface="Cambria Math" panose="02040503050406030204" pitchFamily="18" charset="0"/>
+                                <a:latin typeface="Cambria Math" charset="0"/>
                               </a:rPr>
                             </m:ctrlPr>
                           </m:dPr>
@@ -11361,7 +11399,7 @@
                         <m:sSubSupPr>
                           <m:ctrlPr>
                             <a:rPr lang="en-US" sz="3600" i="1" smtClean="0">
-                              <a:latin typeface="Cambria Math" panose="02040503050406030204" pitchFamily="18" charset="0"/>
+                              <a:latin typeface="Cambria Math" charset="0"/>
                             </a:rPr>
                           </m:ctrlPr>
                         </m:sSubSupPr>
@@ -11406,7 +11444,7 @@
                         <m:dPr>
                           <m:ctrlPr>
                             <a:rPr lang="en-US" sz="3600" i="1" smtClean="0">
-                              <a:latin typeface="Cambria Math" panose="02040503050406030204" pitchFamily="18" charset="0"/>
+                              <a:latin typeface="Cambria Math" charset="0"/>
                             </a:rPr>
                           </m:ctrlPr>
                         </m:dPr>
@@ -11429,7 +11467,7 @@
                         <m:sSubSupPr>
                           <m:ctrlPr>
                             <a:rPr lang="en-US" sz="3600" b="0" i="1" smtClean="0">
-                              <a:latin typeface="Cambria Math" panose="02040503050406030204" pitchFamily="18" charset="0"/>
+                              <a:latin typeface="Cambria Math" charset="0"/>
                             </a:rPr>
                           </m:ctrlPr>
                         </m:sSubSupPr>
@@ -11464,7 +11502,7 @@
                           <m:endChr m:val="]"/>
                           <m:ctrlPr>
                             <a:rPr lang="en-US" sz="3600" b="0" i="1" smtClean="0">
-                              <a:latin typeface="Cambria Math" panose="02040503050406030204" pitchFamily="18" charset="0"/>
+                              <a:latin typeface="Cambria Math" charset="0"/>
                             </a:rPr>
                           </m:ctrlPr>
                         </m:dPr>
@@ -11473,7 +11511,7 @@
                             <m:dPr>
                               <m:ctrlPr>
                                 <a:rPr lang="en-US" sz="3600" b="0" i="1" smtClean="0">
-                                  <a:latin typeface="Cambria Math" panose="02040503050406030204" pitchFamily="18" charset="0"/>
+                                  <a:latin typeface="Cambria Math" charset="0"/>
                                 </a:rPr>
                               </m:ctrlPr>
                             </m:dPr>
@@ -12279,7 +12317,7 @@
                         <m:dPr>
                           <m:ctrlPr>
                             <a:rPr lang="en-US" b="0" i="1" smtClean="0">
-                              <a:latin typeface="Cambria Math" panose="02040503050406030204" pitchFamily="18" charset="0"/>
+                              <a:latin typeface="Cambria Math" charset="0"/>
                             </a:rPr>
                           </m:ctrlPr>
                         </m:dPr>
@@ -12316,7 +12354,7 @@
                           <m:endChr m:val=""/>
                           <m:ctrlPr>
                             <a:rPr lang="en-US" b="0" i="1" smtClean="0">
-                              <a:latin typeface="Cambria Math" panose="02040503050406030204" pitchFamily="18" charset="0"/>
+                              <a:latin typeface="Cambria Math" charset="0"/>
                             </a:rPr>
                           </m:ctrlPr>
                         </m:dPr>
@@ -12325,7 +12363,7 @@
                             <m:eqArrPr>
                               <m:ctrlPr>
                                 <a:rPr lang="en-US" b="0" i="1" smtClean="0">
-                                  <a:latin typeface="Cambria Math" panose="02040503050406030204" pitchFamily="18" charset="0"/>
+                                  <a:latin typeface="Cambria Math" charset="0"/>
                                 </a:rPr>
                               </m:ctrlPr>
                             </m:eqArrPr>
@@ -12346,7 +12384,7 @@
                                 <m:dPr>
                                   <m:ctrlPr>
                                     <a:rPr lang="en-US" b="0" i="1" smtClean="0">
-                                      <a:latin typeface="Cambria Math" panose="02040503050406030204" pitchFamily="18" charset="0"/>
+                                      <a:latin typeface="Cambria Math" charset="0"/>
                                     </a:rPr>
                                   </m:ctrlPr>
                                 </m:dPr>
@@ -12491,7 +12529,7 @@
                       <m:sSupPr>
                         <m:ctrlPr>
                           <a:rPr lang="en-US" b="0" i="1" smtClean="0">
-                            <a:latin typeface="Cambria Math" panose="02040503050406030204" pitchFamily="18" charset="0"/>
+                            <a:latin typeface="Cambria Math" charset="0"/>
                           </a:rPr>
                         </m:ctrlPr>
                       </m:sSupPr>
@@ -12502,7 +12540,7 @@
                             <m:endChr m:val="]"/>
                             <m:ctrlPr>
                               <a:rPr lang="en-US" b="0" i="1" smtClean="0">
-                                <a:latin typeface="Cambria Math" panose="02040503050406030204" pitchFamily="18" charset="0"/>
+                                <a:latin typeface="Cambria Math" charset="0"/>
                               </a:rPr>
                             </m:ctrlPr>
                           </m:dPr>
@@ -12511,7 +12549,7 @@
                               <m:sSubSupPr>
                                 <m:ctrlPr>
                                   <a:rPr lang="en-US" b="0" i="1" smtClean="0">
-                                    <a:latin typeface="Cambria Math" panose="02040503050406030204" pitchFamily="18" charset="0"/>
+                                    <a:latin typeface="Cambria Math" charset="0"/>
                                   </a:rPr>
                                 </m:ctrlPr>
                               </m:sSubSupPr>
@@ -12528,7 +12566,7 @@
                                   <m:sSupPr>
                                     <m:ctrlPr>
                                       <a:rPr lang="en-US" b="0" i="1" smtClean="0">
-                                        <a:latin typeface="Cambria Math" panose="02040503050406030204" pitchFamily="18" charset="0"/>
+                                        <a:latin typeface="Cambria Math" charset="0"/>
                                       </a:rPr>
                                     </m:ctrlPr>
                                   </m:sSupPr>
@@ -12563,7 +12601,7 @@
                               <m:dPr>
                                 <m:ctrlPr>
                                   <a:rPr lang="en-US" b="0" i="1" smtClean="0">
-                                    <a:latin typeface="Cambria Math" panose="02040503050406030204" pitchFamily="18" charset="0"/>
+                                    <a:latin typeface="Cambria Math" charset="0"/>
                                   </a:rPr>
                                 </m:ctrlPr>
                               </m:dPr>
@@ -12981,7 +13019,7 @@
                           <m:sSupPr>
                             <m:ctrlPr>
                               <a:rPr lang="en-US" i="1" smtClean="0">
-                                <a:latin typeface="Cambria Math" panose="02040503050406030204" pitchFamily="18" charset="0"/>
+                                <a:latin typeface="Cambria Math" charset="0"/>
                               </a:rPr>
                             </m:ctrlPr>
                           </m:sSupPr>
@@ -13295,7 +13333,7 @@
                           <m:sSupPr>
                             <m:ctrlPr>
                               <a:rPr lang="en-US" i="1" smtClean="0">
-                                <a:latin typeface="Cambria Math" panose="02040503050406030204" pitchFamily="18" charset="0"/>
+                                <a:latin typeface="Cambria Math" charset="0"/>
                               </a:rPr>
                             </m:ctrlPr>
                           </m:sSupPr>
@@ -14357,7 +14395,7 @@
                         <m:dPr>
                           <m:ctrlPr>
                             <a:rPr lang="en-US" b="0" i="1" smtClean="0">
-                              <a:latin typeface="Cambria Math" panose="02040503050406030204" pitchFamily="18" charset="0"/>
+                              <a:latin typeface="Cambria Math" charset="0"/>
                             </a:rPr>
                           </m:ctrlPr>
                         </m:dPr>
@@ -14394,7 +14432,7 @@
                           <m:endChr m:val=""/>
                           <m:ctrlPr>
                             <a:rPr lang="en-US" b="0" i="1" smtClean="0">
-                              <a:latin typeface="Cambria Math" panose="02040503050406030204" pitchFamily="18" charset="0"/>
+                              <a:latin typeface="Cambria Math" charset="0"/>
                             </a:rPr>
                           </m:ctrlPr>
                         </m:dPr>
@@ -14403,7 +14441,7 @@
                             <m:eqArrPr>
                               <m:ctrlPr>
                                 <a:rPr lang="en-US" b="0" i="1" smtClean="0">
-                                  <a:latin typeface="Cambria Math" panose="02040503050406030204" pitchFamily="18" charset="0"/>
+                                  <a:latin typeface="Cambria Math" charset="0"/>
                                 </a:rPr>
                               </m:ctrlPr>
                             </m:eqArrPr>
@@ -14418,7 +14456,7 @@
                                 <m:dPr>
                                   <m:ctrlPr>
                                     <a:rPr lang="en-US" b="0" i="1" smtClean="0">
-                                      <a:latin typeface="Cambria Math" panose="02040503050406030204" pitchFamily="18" charset="0"/>
+                                      <a:latin typeface="Cambria Math" charset="0"/>
                                     </a:rPr>
                                   </m:ctrlPr>
                                 </m:dPr>
@@ -14583,7 +14621,7 @@
                       <m:sSubSupPr>
                         <m:ctrlPr>
                           <a:rPr lang="en-US" b="0" i="1" smtClean="0">
-                            <a:latin typeface="Cambria Math" panose="02040503050406030204" pitchFamily="18" charset="0"/>
+                            <a:latin typeface="Cambria Math" charset="0"/>
                           </a:rPr>
                         </m:ctrlPr>
                       </m:sSubSupPr>
@@ -14616,7 +14654,7 @@
                       <m:dPr>
                         <m:ctrlPr>
                           <a:rPr lang="en-US" b="0" i="1" smtClean="0">
-                            <a:latin typeface="Cambria Math" panose="02040503050406030204" pitchFamily="18" charset="0"/>
+                            <a:latin typeface="Cambria Math" charset="0"/>
                           </a:rPr>
                         </m:ctrlPr>
                       </m:dPr>
@@ -14865,7 +14903,7 @@
                             <m:sSubSupPr>
                               <m:ctrlPr>
                                 <a:rPr lang="en-US" sz="2400" i="1" smtClean="0">
-                                  <a:latin typeface="Cambria Math" panose="02040503050406030204" pitchFamily="18" charset="0"/>
+                                  <a:latin typeface="Cambria Math" charset="0"/>
                                 </a:rPr>
                               </m:ctrlPr>
                             </m:sSubSupPr>
@@ -14898,7 +14936,7 @@
                             <m:dPr>
                               <m:ctrlPr>
                                 <a:rPr lang="en-US" sz="2400" i="1" smtClean="0">
-                                  <a:latin typeface="Cambria Math" panose="02040503050406030204" pitchFamily="18" charset="0"/>
+                                  <a:latin typeface="Cambria Math" charset="0"/>
                                 </a:rPr>
                               </m:ctrlPr>
                             </m:dPr>
@@ -15098,7 +15136,7 @@
                             <m:sSubSupPr>
                               <m:ctrlPr>
                                 <a:rPr lang="en-US" sz="2400" i="1" smtClean="0">
-                                  <a:latin typeface="Cambria Math" panose="02040503050406030204" pitchFamily="18" charset="0"/>
+                                  <a:latin typeface="Cambria Math" charset="0"/>
                                 </a:rPr>
                               </m:ctrlPr>
                             </m:sSubSupPr>
@@ -15131,7 +15169,7 @@
                             <m:dPr>
                               <m:ctrlPr>
                                 <a:rPr lang="en-US" sz="2400" i="1" smtClean="0">
-                                  <a:latin typeface="Cambria Math" panose="02040503050406030204" pitchFamily="18" charset="0"/>
+                                  <a:latin typeface="Cambria Math" charset="0"/>
                                 </a:rPr>
                               </m:ctrlPr>
                             </m:dPr>
@@ -16387,7 +16425,7 @@
                         <m:dPr>
                           <m:ctrlPr>
                             <a:rPr lang="en-US" b="0" i="1" smtClean="0">
-                              <a:latin typeface="Cambria Math" panose="02040503050406030204" pitchFamily="18" charset="0"/>
+                              <a:latin typeface="Cambria Math" charset="0"/>
                               <a:ea typeface="Cambria Math"/>
                             </a:rPr>
                           </m:ctrlPr>
@@ -16411,7 +16449,7 @@
                             <m:sSubPr>
                               <m:ctrlPr>
                                 <a:rPr lang="en-US" b="0" i="1" smtClean="0">
-                                  <a:latin typeface="Cambria Math" panose="02040503050406030204" pitchFamily="18" charset="0"/>
+                                  <a:latin typeface="Cambria Math" charset="0"/>
                                   <a:ea typeface="Cambria Math"/>
                                 </a:rPr>
                               </m:ctrlPr>
@@ -16448,7 +16486,7 @@
                         <m:dPr>
                           <m:ctrlPr>
                             <a:rPr lang="en-US" b="0" i="1" smtClean="0">
-                              <a:latin typeface="Cambria Math" panose="02040503050406030204" pitchFamily="18" charset="0"/>
+                              <a:latin typeface="Cambria Math" charset="0"/>
                               <a:ea typeface="Cambria Math"/>
                             </a:rPr>
                           </m:ctrlPr>
@@ -16458,7 +16496,7 @@
                             <m:sSupPr>
                               <m:ctrlPr>
                                 <a:rPr lang="en-US" b="0" i="1" smtClean="0">
-                                  <a:latin typeface="Cambria Math" panose="02040503050406030204" pitchFamily="18" charset="0"/>
+                                  <a:latin typeface="Cambria Math" charset="0"/>
                                   <a:ea typeface="Cambria Math"/>
                                 </a:rPr>
                               </m:ctrlPr>
@@ -16493,7 +16531,7 @@
                             <m:sSubPr>
                               <m:ctrlPr>
                                 <a:rPr lang="en-US" b="0" i="1" smtClean="0">
-                                  <a:latin typeface="Cambria Math" panose="02040503050406030204" pitchFamily="18" charset="0"/>
+                                  <a:latin typeface="Cambria Math" charset="0"/>
                                   <a:ea typeface="Cambria Math"/>
                                 </a:rPr>
                               </m:ctrlPr>
@@ -16898,7 +16936,7 @@
                         <m:dPr>
                           <m:ctrlPr>
                             <a:rPr lang="en-US" i="1" smtClean="0">
-                              <a:latin typeface="Cambria Math" panose="02040503050406030204" pitchFamily="18" charset="0"/>
+                              <a:latin typeface="Cambria Math" charset="0"/>
                             </a:rPr>
                           </m:ctrlPr>
                         </m:dPr>
@@ -16920,7 +16958,7 @@
                             <m:sSubPr>
                               <m:ctrlPr>
                                 <a:rPr lang="en-US" b="0" i="1" smtClean="0">
-                                  <a:latin typeface="Cambria Math" panose="02040503050406030204" pitchFamily="18" charset="0"/>
+                                  <a:latin typeface="Cambria Math" charset="0"/>
                                   <a:ea typeface="Cambria Math"/>
                                 </a:rPr>
                               </m:ctrlPr>
@@ -16957,7 +16995,7 @@
                         <m:dPr>
                           <m:ctrlPr>
                             <a:rPr lang="en-US" i="1">
-                              <a:latin typeface="Cambria Math" panose="02040503050406030204" pitchFamily="18" charset="0"/>
+                              <a:latin typeface="Cambria Math" charset="0"/>
                             </a:rPr>
                           </m:ctrlPr>
                         </m:dPr>
@@ -16979,7 +17017,7 @@
                             <m:sSubPr>
                               <m:ctrlPr>
                                 <a:rPr lang="en-US" i="1">
-                                  <a:latin typeface="Cambria Math" panose="02040503050406030204" pitchFamily="18" charset="0"/>
+                                  <a:latin typeface="Cambria Math" charset="0"/>
                                   <a:ea typeface="Cambria Math"/>
                                 </a:rPr>
                               </m:ctrlPr>
@@ -17016,7 +17054,7 @@
                         <m:dPr>
                           <m:ctrlPr>
                             <a:rPr lang="en-US" i="1">
-                              <a:latin typeface="Cambria Math" panose="02040503050406030204" pitchFamily="18" charset="0"/>
+                              <a:latin typeface="Cambria Math" charset="0"/>
                             </a:rPr>
                           </m:ctrlPr>
                         </m:dPr>
@@ -17038,7 +17076,7 @@
                             <m:sSubPr>
                               <m:ctrlPr>
                                 <a:rPr lang="en-US" i="1">
-                                  <a:latin typeface="Cambria Math" panose="02040503050406030204" pitchFamily="18" charset="0"/>
+                                  <a:latin typeface="Cambria Math" charset="0"/>
                                   <a:ea typeface="Cambria Math"/>
                                 </a:rPr>
                               </m:ctrlPr>
@@ -17075,7 +17113,7 @@
                         <m:dPr>
                           <m:ctrlPr>
                             <a:rPr lang="en-US" i="1">
-                              <a:latin typeface="Cambria Math" panose="02040503050406030204" pitchFamily="18" charset="0"/>
+                              <a:latin typeface="Cambria Math" charset="0"/>
                             </a:rPr>
                           </m:ctrlPr>
                         </m:dPr>
@@ -17097,7 +17135,7 @@
                             <m:sSubPr>
                               <m:ctrlPr>
                                 <a:rPr lang="en-US" i="1">
-                                  <a:latin typeface="Cambria Math" panose="02040503050406030204" pitchFamily="18" charset="0"/>
+                                  <a:latin typeface="Cambria Math" charset="0"/>
                                   <a:ea typeface="Cambria Math"/>
                                 </a:rPr>
                               </m:ctrlPr>
@@ -17459,7 +17497,7 @@
                         <m:dPr>
                           <m:ctrlPr>
                             <a:rPr lang="en-US" b="0" i="1" smtClean="0">
-                              <a:latin typeface="Cambria Math" panose="02040503050406030204" pitchFamily="18" charset="0"/>
+                              <a:latin typeface="Cambria Math" charset="0"/>
                               <a:ea typeface="Cambria Math"/>
                             </a:rPr>
                           </m:ctrlPr>
@@ -18298,7 +18336,7 @@
                         <m:dPr>
                           <m:ctrlPr>
                             <a:rPr lang="en-US" b="0" i="1" smtClean="0">
-                              <a:latin typeface="Cambria Math" panose="02040503050406030204" pitchFamily="18" charset="0"/>
+                              <a:latin typeface="Cambria Math" charset="0"/>
                               <a:ea typeface="Cambria Math"/>
                             </a:rPr>
                           </m:ctrlPr>
@@ -18315,7 +18353,7 @@
                             <m:dPr>
                               <m:ctrlPr>
                                 <a:rPr lang="en-US" b="0" i="1" smtClean="0">
-                                  <a:latin typeface="Cambria Math" panose="02040503050406030204" pitchFamily="18" charset="0"/>
+                                  <a:latin typeface="Cambria Math" charset="0"/>
                                   <a:ea typeface="Cambria Math"/>
                                 </a:rPr>
                               </m:ctrlPr>
@@ -18339,7 +18377,7 @@
                                 <m:sSubPr>
                                   <m:ctrlPr>
                                     <a:rPr lang="en-US" b="0" i="1" smtClean="0">
-                                      <a:latin typeface="Cambria Math" panose="02040503050406030204" pitchFamily="18" charset="0"/>
+                                      <a:latin typeface="Cambria Math" charset="0"/>
                                       <a:ea typeface="Cambria Math"/>
                                     </a:rPr>
                                   </m:ctrlPr>
@@ -18376,7 +18414,7 @@
                             <m:sSubPr>
                               <m:ctrlPr>
                                 <a:rPr lang="en-US" b="0" i="1" smtClean="0">
-                                  <a:latin typeface="Cambria Math" panose="02040503050406030204" pitchFamily="18" charset="0"/>
+                                  <a:latin typeface="Cambria Math" charset="0"/>
                                   <a:ea typeface="Cambria Math"/>
                                 </a:rPr>
                               </m:ctrlPr>
@@ -18413,7 +18451,7 @@
                         <m:sSubPr>
                           <m:ctrlPr>
                             <a:rPr lang="en-US" b="0" i="1" smtClean="0">
-                              <a:latin typeface="Cambria Math" panose="02040503050406030204" pitchFamily="18" charset="0"/>
+                              <a:latin typeface="Cambria Math" charset="0"/>
                               <a:ea typeface="Cambria Math"/>
                             </a:rPr>
                           </m:ctrlPr>
@@ -18766,7 +18804,7 @@
                         <m:sSubPr>
                           <m:ctrlPr>
                             <a:rPr lang="en-US" i="1">
-                              <a:latin typeface="Cambria Math" panose="02040503050406030204" pitchFamily="18" charset="0"/>
+                              <a:latin typeface="Cambria Math" charset="0"/>
                               <a:ea typeface="Cambria Math"/>
                             </a:rPr>
                           </m:ctrlPr>
@@ -18872,7 +18910,7 @@
                         <m:sSubPr>
                           <m:ctrlPr>
                             <a:rPr lang="en-US" i="1" smtClean="0">
-                              <a:latin typeface="Cambria Math" panose="02040503050406030204" pitchFamily="18" charset="0"/>
+                              <a:latin typeface="Cambria Math" charset="0"/>
                               <a:ea typeface="Cambria Math"/>
                             </a:rPr>
                           </m:ctrlPr>
@@ -18907,7 +18945,7 @@
                         <m:sSubPr>
                           <m:ctrlPr>
                             <a:rPr lang="en-US" i="1">
-                              <a:latin typeface="Cambria Math" panose="02040503050406030204" pitchFamily="18" charset="0"/>
+                              <a:latin typeface="Cambria Math" charset="0"/>
                               <a:ea typeface="Cambria Math"/>
                             </a:rPr>
                           </m:ctrlPr>
@@ -19020,7 +19058,7 @@
                         <m:dPr>
                           <m:ctrlPr>
                             <a:rPr lang="en-US" i="1">
-                              <a:latin typeface="Cambria Math" panose="02040503050406030204" pitchFamily="18" charset="0"/>
+                              <a:latin typeface="Cambria Math" charset="0"/>
                               <a:ea typeface="Cambria Math"/>
                             </a:rPr>
                           </m:ctrlPr>
@@ -19037,7 +19075,7 @@
                             <m:dPr>
                               <m:ctrlPr>
                                 <a:rPr lang="en-US" i="1">
-                                  <a:latin typeface="Cambria Math" panose="02040503050406030204" pitchFamily="18" charset="0"/>
+                                  <a:latin typeface="Cambria Math" charset="0"/>
                                   <a:ea typeface="Cambria Math"/>
                                 </a:rPr>
                               </m:ctrlPr>
@@ -19047,7 +19085,7 @@
                                 <m:sSubPr>
                                   <m:ctrlPr>
                                     <a:rPr lang="en-US" i="1" smtClean="0">
-                                      <a:latin typeface="Cambria Math" panose="02040503050406030204" pitchFamily="18" charset="0"/>
+                                      <a:latin typeface="Cambria Math" charset="0"/>
                                       <a:ea typeface="Cambria Math"/>
                                     </a:rPr>
                                   </m:ctrlPr>
@@ -19082,7 +19120,7 @@
                                 <m:sSubPr>
                                   <m:ctrlPr>
                                     <a:rPr lang="en-US" i="1">
-                                      <a:latin typeface="Cambria Math" panose="02040503050406030204" pitchFamily="18" charset="0"/>
+                                      <a:latin typeface="Cambria Math" charset="0"/>
                                       <a:ea typeface="Cambria Math"/>
                                     </a:rPr>
                                   </m:ctrlPr>
@@ -19119,7 +19157,7 @@
                             <m:sSubPr>
                               <m:ctrlPr>
                                 <a:rPr lang="en-US" i="1">
-                                  <a:latin typeface="Cambria Math" panose="02040503050406030204" pitchFamily="18" charset="0"/>
+                                  <a:latin typeface="Cambria Math" charset="0"/>
                                   <a:ea typeface="Cambria Math"/>
                                 </a:rPr>
                               </m:ctrlPr>
@@ -19156,7 +19194,7 @@
                         <m:sSubPr>
                           <m:ctrlPr>
                             <a:rPr lang="en-US" i="1">
-                              <a:latin typeface="Cambria Math" panose="02040503050406030204" pitchFamily="18" charset="0"/>
+                              <a:latin typeface="Cambria Math" charset="0"/>
                               <a:ea typeface="Cambria Math"/>
                             </a:rPr>
                           </m:ctrlPr>
@@ -19773,7 +19811,7 @@
                         <m:dPr>
                           <m:ctrlPr>
                             <a:rPr lang="en-US" i="1">
-                              <a:latin typeface="Cambria Math" panose="02040503050406030204" pitchFamily="18" charset="0"/>
+                              <a:latin typeface="Cambria Math" charset="0"/>
                               <a:ea typeface="Cambria Math"/>
                             </a:rPr>
                           </m:ctrlPr>
@@ -19790,7 +19828,7 @@
                             <m:dPr>
                               <m:ctrlPr>
                                 <a:rPr lang="en-US" i="1">
-                                  <a:latin typeface="Cambria Math" panose="02040503050406030204" pitchFamily="18" charset="0"/>
+                                  <a:latin typeface="Cambria Math" charset="0"/>
                                   <a:ea typeface="Cambria Math"/>
                                 </a:rPr>
                               </m:ctrlPr>
@@ -19814,7 +19852,7 @@
                                 <m:sSubPr>
                                   <m:ctrlPr>
                                     <a:rPr lang="en-US" i="1">
-                                      <a:latin typeface="Cambria Math" panose="02040503050406030204" pitchFamily="18" charset="0"/>
+                                      <a:latin typeface="Cambria Math" charset="0"/>
                                       <a:ea typeface="Cambria Math"/>
                                     </a:rPr>
                                   </m:ctrlPr>
@@ -19851,7 +19889,7 @@
                             <m:sSubPr>
                               <m:ctrlPr>
                                 <a:rPr lang="en-US" i="1">
-                                  <a:latin typeface="Cambria Math" panose="02040503050406030204" pitchFamily="18" charset="0"/>
+                                  <a:latin typeface="Cambria Math" charset="0"/>
                                   <a:ea typeface="Cambria Math"/>
                                 </a:rPr>
                               </m:ctrlPr>
@@ -19888,7 +19926,7 @@
                         <m:sSubPr>
                           <m:ctrlPr>
                             <a:rPr lang="en-US" i="1">
-                              <a:latin typeface="Cambria Math" panose="02040503050406030204" pitchFamily="18" charset="0"/>
+                              <a:latin typeface="Cambria Math" charset="0"/>
                               <a:ea typeface="Cambria Math"/>
                             </a:rPr>
                           </m:ctrlPr>
@@ -20241,7 +20279,7 @@
                         <m:sSubPr>
                           <m:ctrlPr>
                             <a:rPr lang="en-US" i="1">
-                              <a:latin typeface="Cambria Math" panose="02040503050406030204" pitchFamily="18" charset="0"/>
+                              <a:latin typeface="Cambria Math" charset="0"/>
                               <a:ea typeface="Cambria Math"/>
                             </a:rPr>
                           </m:ctrlPr>
@@ -20347,7 +20385,7 @@
                         <m:sSubPr>
                           <m:ctrlPr>
                             <a:rPr lang="en-US" i="1" smtClean="0">
-                              <a:latin typeface="Cambria Math" panose="02040503050406030204" pitchFamily="18" charset="0"/>
+                              <a:latin typeface="Cambria Math" charset="0"/>
                               <a:ea typeface="Cambria Math"/>
                             </a:rPr>
                           </m:ctrlPr>
@@ -20382,7 +20420,7 @@
                         <m:sSubPr>
                           <m:ctrlPr>
                             <a:rPr lang="en-US" i="1">
-                              <a:latin typeface="Cambria Math" panose="02040503050406030204" pitchFamily="18" charset="0"/>
+                              <a:latin typeface="Cambria Math" charset="0"/>
                               <a:ea typeface="Cambria Math"/>
                             </a:rPr>
                           </m:ctrlPr>
@@ -20495,7 +20533,7 @@
                         <m:dPr>
                           <m:ctrlPr>
                             <a:rPr lang="en-US" i="1">
-                              <a:latin typeface="Cambria Math" panose="02040503050406030204" pitchFamily="18" charset="0"/>
+                              <a:latin typeface="Cambria Math" charset="0"/>
                               <a:ea typeface="Cambria Math"/>
                             </a:rPr>
                           </m:ctrlPr>
@@ -20512,7 +20550,7 @@
                             <m:dPr>
                               <m:ctrlPr>
                                 <a:rPr lang="en-US" i="1">
-                                  <a:latin typeface="Cambria Math" panose="02040503050406030204" pitchFamily="18" charset="0"/>
+                                  <a:latin typeface="Cambria Math" charset="0"/>
                                   <a:ea typeface="Cambria Math"/>
                                 </a:rPr>
                               </m:ctrlPr>
@@ -20522,7 +20560,7 @@
                                 <m:sSubPr>
                                   <m:ctrlPr>
                                     <a:rPr lang="en-US" i="1" smtClean="0">
-                                      <a:latin typeface="Cambria Math" panose="02040503050406030204" pitchFamily="18" charset="0"/>
+                                      <a:latin typeface="Cambria Math" charset="0"/>
                                       <a:ea typeface="Cambria Math"/>
                                     </a:rPr>
                                   </m:ctrlPr>
@@ -20557,7 +20595,7 @@
                                 <m:sSubPr>
                                   <m:ctrlPr>
                                     <a:rPr lang="en-US" i="1">
-                                      <a:latin typeface="Cambria Math" panose="02040503050406030204" pitchFamily="18" charset="0"/>
+                                      <a:latin typeface="Cambria Math" charset="0"/>
                                       <a:ea typeface="Cambria Math"/>
                                     </a:rPr>
                                   </m:ctrlPr>
@@ -20594,7 +20632,7 @@
                             <m:sSubPr>
                               <m:ctrlPr>
                                 <a:rPr lang="en-US" i="1">
-                                  <a:latin typeface="Cambria Math" panose="02040503050406030204" pitchFamily="18" charset="0"/>
+                                  <a:latin typeface="Cambria Math" charset="0"/>
                                   <a:ea typeface="Cambria Math"/>
                                 </a:rPr>
                               </m:ctrlPr>
@@ -20631,7 +20669,7 @@
                         <m:sSubPr>
                           <m:ctrlPr>
                             <a:rPr lang="en-US" i="1">
-                              <a:latin typeface="Cambria Math" panose="02040503050406030204" pitchFamily="18" charset="0"/>
+                              <a:latin typeface="Cambria Math" charset="0"/>
                               <a:ea typeface="Cambria Math"/>
                             </a:rPr>
                           </m:ctrlPr>

</xml_diff>